<commit_message>
saved changes to figure 1 layout ppt
</commit_message>
<xml_diff>
--- a/paper/main_figures/Fig1A.pptx
+++ b/paper/main_figures/Fig1A.pptx
@@ -288,7 +288,7 @@
           <a:p>
             <a:fld id="{91FD018C-AC80-4D60-BFEC-75D7D34C589D}" type="datetimeFigureOut">
               <a:rPr lang="en-US" smtClean="0"/>
-              <a:t>8/3/2017</a:t>
+              <a:t>2/26/2018</a:t>
             </a:fld>
             <a:endParaRPr lang="en-US"/>
           </a:p>
@@ -458,7 +458,7 @@
           <a:p>
             <a:fld id="{91FD018C-AC80-4D60-BFEC-75D7D34C589D}" type="datetimeFigureOut">
               <a:rPr lang="en-US" smtClean="0"/>
-              <a:t>8/3/2017</a:t>
+              <a:t>2/26/2018</a:t>
             </a:fld>
             <a:endParaRPr lang="en-US"/>
           </a:p>
@@ -638,7 +638,7 @@
           <a:p>
             <a:fld id="{91FD018C-AC80-4D60-BFEC-75D7D34C589D}" type="datetimeFigureOut">
               <a:rPr lang="en-US" smtClean="0"/>
-              <a:t>8/3/2017</a:t>
+              <a:t>2/26/2018</a:t>
             </a:fld>
             <a:endParaRPr lang="en-US"/>
           </a:p>
@@ -808,7 +808,7 @@
           <a:p>
             <a:fld id="{91FD018C-AC80-4D60-BFEC-75D7D34C589D}" type="datetimeFigureOut">
               <a:rPr lang="en-US" smtClean="0"/>
-              <a:t>8/3/2017</a:t>
+              <a:t>2/26/2018</a:t>
             </a:fld>
             <a:endParaRPr lang="en-US"/>
           </a:p>
@@ -1054,7 +1054,7 @@
           <a:p>
             <a:fld id="{91FD018C-AC80-4D60-BFEC-75D7D34C589D}" type="datetimeFigureOut">
               <a:rPr lang="en-US" smtClean="0"/>
-              <a:t>8/3/2017</a:t>
+              <a:t>2/26/2018</a:t>
             </a:fld>
             <a:endParaRPr lang="en-US"/>
           </a:p>
@@ -1342,7 +1342,7 @@
           <a:p>
             <a:fld id="{91FD018C-AC80-4D60-BFEC-75D7D34C589D}" type="datetimeFigureOut">
               <a:rPr lang="en-US" smtClean="0"/>
-              <a:t>8/3/2017</a:t>
+              <a:t>2/26/2018</a:t>
             </a:fld>
             <a:endParaRPr lang="en-US"/>
           </a:p>
@@ -1769,7 +1769,7 @@
           <a:p>
             <a:fld id="{91FD018C-AC80-4D60-BFEC-75D7D34C589D}" type="datetimeFigureOut">
               <a:rPr lang="en-US" smtClean="0"/>
-              <a:t>8/3/2017</a:t>
+              <a:t>2/26/2018</a:t>
             </a:fld>
             <a:endParaRPr lang="en-US"/>
           </a:p>
@@ -1887,7 +1887,7 @@
           <a:p>
             <a:fld id="{91FD018C-AC80-4D60-BFEC-75D7D34C589D}" type="datetimeFigureOut">
               <a:rPr lang="en-US" smtClean="0"/>
-              <a:t>8/3/2017</a:t>
+              <a:t>2/26/2018</a:t>
             </a:fld>
             <a:endParaRPr lang="en-US"/>
           </a:p>
@@ -1982,7 +1982,7 @@
           <a:p>
             <a:fld id="{91FD018C-AC80-4D60-BFEC-75D7D34C589D}" type="datetimeFigureOut">
               <a:rPr lang="en-US" smtClean="0"/>
-              <a:t>8/3/2017</a:t>
+              <a:t>2/26/2018</a:t>
             </a:fld>
             <a:endParaRPr lang="en-US"/>
           </a:p>
@@ -2259,7 +2259,7 @@
           <a:p>
             <a:fld id="{91FD018C-AC80-4D60-BFEC-75D7D34C589D}" type="datetimeFigureOut">
               <a:rPr lang="en-US" smtClean="0"/>
-              <a:t>8/3/2017</a:t>
+              <a:t>2/26/2018</a:t>
             </a:fld>
             <a:endParaRPr lang="en-US"/>
           </a:p>
@@ -2512,7 +2512,7 @@
           <a:p>
             <a:fld id="{91FD018C-AC80-4D60-BFEC-75D7D34C589D}" type="datetimeFigureOut">
               <a:rPr lang="en-US" smtClean="0"/>
-              <a:t>8/3/2017</a:t>
+              <a:t>2/26/2018</a:t>
             </a:fld>
             <a:endParaRPr lang="en-US"/>
           </a:p>
@@ -2725,7 +2725,7 @@
           <a:p>
             <a:fld id="{91FD018C-AC80-4D60-BFEC-75D7D34C589D}" type="datetimeFigureOut">
               <a:rPr lang="en-US" smtClean="0"/>
-              <a:t>8/3/2017</a:t>
+              <a:t>2/26/2018</a:t>
             </a:fld>
             <a:endParaRPr lang="en-US"/>
           </a:p>
@@ -3169,7 +3169,7 @@
           <p:spPr>
             <a:xfrm>
               <a:off x="18388289" y="3360003"/>
-              <a:ext cx="2487951" cy="830997"/>
+              <a:ext cx="2487951" cy="461665"/>
             </a:xfrm>
             <a:prstGeom prst="rect">
               <a:avLst/>
@@ -3184,7 +3184,15 @@
             <a:p>
               <a:r>
                 <a:rPr lang="en-US" sz="2400" dirty="0" smtClean="0"/>
-                <a:t>Europe C→T elevation (1)</a:t>
+                <a:t>Europe C→T </a:t>
+              </a:r>
+              <a:r>
+                <a:rPr lang="en-US" sz="2400" dirty="0" smtClean="0"/>
+                <a:t>enriched </a:t>
+              </a:r>
+              <a:r>
+                <a:rPr lang="en-US" sz="2400" dirty="0" smtClean="0"/>
+                <a:t>(1)</a:t>
               </a:r>
               <a:endParaRPr lang="en-US" sz="2400" dirty="0"/>
             </a:p>
@@ -3336,7 +3344,15 @@
             <a:p>
               <a:r>
                 <a:rPr lang="en-US" sz="2400" dirty="0" smtClean="0"/>
-                <a:t>Asia elevated (2)</a:t>
+                <a:t>Asia </a:t>
+              </a:r>
+              <a:r>
+                <a:rPr lang="en-US" sz="2400" dirty="0" smtClean="0"/>
+                <a:t>enriched </a:t>
+              </a:r>
+              <a:r>
+                <a:rPr lang="en-US" sz="2400" dirty="0" smtClean="0"/>
+                <a:t>(2)</a:t>
               </a:r>
               <a:endParaRPr lang="en-US" sz="2400" dirty="0"/>
             </a:p>
@@ -3614,14 +3630,14 @@
           <p:nvPr>
             <p:extLst>
               <p:ext uri="{D42A27DB-BD31-4B8C-83A1-F6EECF244321}">
-                <p14:modId xmlns:p14="http://schemas.microsoft.com/office/powerpoint/2010/main" val="1588561420"/>
+                <p14:modId xmlns:p14="http://schemas.microsoft.com/office/powerpoint/2010/main" val="4246608672"/>
               </p:ext>
             </p:extLst>
           </p:nvPr>
         </p:nvGraphicFramePr>
         <p:xfrm>
           <a:off x="18745200" y="7345680"/>
-          <a:ext cx="4495800" cy="6827520"/>
+          <a:ext cx="4495800" cy="7025640"/>
         </p:xfrm>
         <a:graphic>
           <a:graphicData uri="http://schemas.openxmlformats.org/drawingml/2006/table">
@@ -3711,7 +3727,11 @@
                       </a:r>
                       <a:r>
                         <a:rPr lang="en-US" sz="2400" dirty="0" smtClean="0"/>
-                        <a:t>elevation (1)</a:t>
+                        <a:t>enriched </a:t>
+                      </a:r>
+                      <a:r>
+                        <a:rPr lang="en-US" sz="2400" dirty="0" smtClean="0"/>
+                        <a:t>(1)</a:t>
                       </a:r>
                       <a:endParaRPr lang="en-US" sz="2400" dirty="0"/>
                     </a:p>
@@ -3770,7 +3790,6 @@
                         <a:rPr lang="en-US" sz="2000" dirty="0" smtClean="0"/>
                         <a:t>TCT→T</a:t>
                       </a:r>
-                      <a:endParaRPr lang="en-US" sz="2000" dirty="0" smtClean="0"/>
                     </a:p>
                     <a:p>
                       <a:pPr algn="ctr"/>
@@ -3806,7 +3825,6 @@
                         <a:rPr lang="en-US" sz="2000" dirty="0" smtClean="0"/>
                         <a:t>TCC→T</a:t>
                       </a:r>
-                      <a:endParaRPr lang="en-US" sz="2000" dirty="0" smtClean="0"/>
                     </a:p>
                   </a:txBody>
                   <a:tcPr anchor="ctr">
@@ -3863,7 +3881,15 @@
                       <a:pPr algn="ctr"/>
                       <a:r>
                         <a:rPr lang="en-US" sz="2400" dirty="0" smtClean="0"/>
-                        <a:t>Asia elevated (2)</a:t>
+                        <a:t>Asia </a:t>
+                      </a:r>
+                      <a:r>
+                        <a:rPr lang="en-US" sz="2400" dirty="0" smtClean="0"/>
+                        <a:t>enriched </a:t>
+                      </a:r>
+                      <a:r>
+                        <a:rPr lang="en-US" sz="2400" dirty="0" smtClean="0"/>
+                        <a:t>(2)</a:t>
                       </a:r>
                       <a:endParaRPr lang="en-US" sz="2400" dirty="0"/>
                     </a:p>
@@ -3922,7 +3948,6 @@
                         <a:rPr lang="en-US" sz="2000" dirty="0" smtClean="0"/>
                         <a:t>GAT→T</a:t>
                       </a:r>
-                      <a:endParaRPr lang="en-US" sz="2000" dirty="0" smtClean="0"/>
                     </a:p>
                     <a:p>
                       <a:pPr algn="ctr"/>
@@ -4115,8 +4140,8 @@
                   </a:tcPr>
                 </a:tc>
               </a:tr>
-              <a:tr h="228600">
-                <a:tc>
+              <a:tr h="807720">
+                <a:tc rowSpan="2">
                   <a:txBody>
                     <a:bodyPr/>
                     <a:lstStyle/>
@@ -4132,7 +4157,15 @@
                       </a:r>
                       <a:r>
                         <a:rPr lang="en-US" sz="2400" dirty="0" smtClean="0"/>
-                        <a:t>enriched (4ab)</a:t>
+                        <a:t>enriched (</a:t>
+                      </a:r>
+                      <a:r>
+                        <a:rPr lang="en-US" sz="2400" dirty="0" smtClean="0"/>
+                        <a:t>4a,  4b</a:t>
+                      </a:r>
+                      <a:r>
+                        <a:rPr lang="en-US" sz="2400" dirty="0" smtClean="0"/>
+                        <a:t>)</a:t>
                       </a:r>
                       <a:endParaRPr lang="en-US" sz="2400" dirty="0"/>
                     </a:p>
@@ -4196,13 +4229,74 @@
                       <a:pPr algn="ctr"/>
                       <a:r>
                         <a:rPr lang="en-US" sz="2000" dirty="0" smtClean="0"/>
-                        <a:t>TAT→T </a:t>
+                        <a:t>TAT→T (a</a:t>
                       </a:r>
                       <a:r>
                         <a:rPr lang="en-US" sz="2000" dirty="0" smtClean="0"/>
-                        <a:t>(a)</a:t>
+                        <a:t>)</a:t>
                       </a:r>
                     </a:p>
+                  </a:txBody>
+                  <a:tcPr anchor="ctr">
+                    <a:lnL w="3175" cap="flat" cmpd="sng" algn="ctr">
+                      <a:solidFill>
+                        <a:schemeClr val="bg1">
+                          <a:lumMod val="65000"/>
+                        </a:schemeClr>
+                      </a:solidFill>
+                      <a:prstDash val="solid"/>
+                      <a:round/>
+                      <a:headEnd type="none" w="med" len="med"/>
+                      <a:tailEnd type="none" w="med" len="med"/>
+                    </a:lnL>
+                    <a:lnR w="3175" cap="flat" cmpd="sng" algn="ctr">
+                      <a:solidFill>
+                        <a:schemeClr val="bg1">
+                          <a:lumMod val="65000"/>
+                        </a:schemeClr>
+                      </a:solidFill>
+                      <a:prstDash val="solid"/>
+                      <a:round/>
+                      <a:headEnd type="none" w="med" len="med"/>
+                      <a:tailEnd type="none" w="med" len="med"/>
+                    </a:lnR>
+                    <a:lnT w="3175" cap="flat" cmpd="sng" algn="ctr">
+                      <a:solidFill>
+                        <a:schemeClr val="tx1"/>
+                      </a:solidFill>
+                      <a:prstDash val="solid"/>
+                      <a:round/>
+                      <a:headEnd type="none" w="med" len="med"/>
+                      <a:tailEnd type="none" w="med" len="med"/>
+                    </a:lnT>
+                    <a:lnB w="3175" cap="flat" cmpd="sng" algn="ctr">
+                      <a:solidFill>
+                        <a:schemeClr val="tx1"/>
+                      </a:solidFill>
+                      <a:prstDash val="solid"/>
+                      <a:round/>
+                      <a:headEnd type="none" w="med" len="med"/>
+                      <a:tailEnd type="none" w="med" len="med"/>
+                    </a:lnB>
+                    <a:noFill/>
+                  </a:tcPr>
+                </a:tc>
+              </a:tr>
+              <a:tr h="807720">
+                <a:tc vMerge="1">
+                  <a:txBody>
+                    <a:bodyPr/>
+                    <a:lstStyle/>
+                    <a:p>
+                      <a:endParaRPr lang="en-US"/>
+                    </a:p>
+                  </a:txBody>
+                  <a:tcPr/>
+                </a:tc>
+                <a:tc>
+                  <a:txBody>
+                    <a:bodyPr/>
+                    <a:lstStyle/>
                     <a:p>
                       <a:pPr algn="ctr"/>
                       <a:r>
@@ -4229,11 +4323,7 @@
                       </a:r>
                       <a:r>
                         <a:rPr lang="en-US" sz="2000" dirty="0" smtClean="0"/>
-                        <a:t>(b</a:t>
-                      </a:r>
-                      <a:r>
-                        <a:rPr lang="en-US" sz="2000" dirty="0" smtClean="0"/>
-                        <a:t>)</a:t>
+                        <a:t>(b)</a:t>
                       </a:r>
                     </a:p>
                   </a:txBody>
@@ -4352,7 +4442,6 @@
                         <a:rPr lang="en-US" sz="2000" dirty="0" smtClean="0"/>
                         <a:t>GCG→G</a:t>
                       </a:r>
-                      <a:endParaRPr lang="en-US" sz="2000" dirty="0" smtClean="0"/>
                     </a:p>
                     <a:p>
                       <a:pPr algn="ctr"/>

</xml_diff>

<commit_message>
updated r0009-bfv to r0010
</commit_message>
<xml_diff>
--- a/paper/main_figures/Fig1A.pptx
+++ b/paper/main_figures/Fig1A.pptx
@@ -6,6 +6,7 @@
   </p:sldMasterIdLst>
   <p:sldIdLst>
     <p:sldId id="259" r:id="rId2"/>
+    <p:sldId id="260" r:id="rId3"/>
   </p:sldIdLst>
   <p:sldSz cx="27432000" cy="18288000"/>
   <p:notesSz cx="6858000" cy="9144000"/>
@@ -104,6 +105,22 @@
       </a:defRPr>
     </a:lvl9pPr>
   </p:defaultTextStyle>
+  <p:extLst>
+    <p:ext uri="{EFAFB233-063F-42B5-8137-9DF3F51BA10A}">
+      <p15:sldGuideLst xmlns:p15="http://schemas.microsoft.com/office/powerpoint/2012/main">
+        <p15:guide id="1" orient="horz" pos="5760">
+          <p15:clr>
+            <a:srgbClr val="A4A3A4"/>
+          </p15:clr>
+        </p15:guide>
+        <p15:guide id="2" pos="8640">
+          <p15:clr>
+            <a:srgbClr val="A4A3A4"/>
+          </p15:clr>
+        </p15:guide>
+      </p15:sldGuideLst>
+    </p:ext>
+  </p:extLst>
 </p:presentation>
 </file>
 
@@ -288,7 +305,7 @@
           <a:p>
             <a:fld id="{91FD018C-AC80-4D60-BFEC-75D7D34C589D}" type="datetimeFigureOut">
               <a:rPr lang="en-US" smtClean="0"/>
-              <a:t>2/26/2018</a:t>
+              <a:t>4/15/18</a:t>
             </a:fld>
             <a:endParaRPr lang="en-US"/>
           </a:p>
@@ -458,7 +475,7 @@
           <a:p>
             <a:fld id="{91FD018C-AC80-4D60-BFEC-75D7D34C589D}" type="datetimeFigureOut">
               <a:rPr lang="en-US" smtClean="0"/>
-              <a:t>2/26/2018</a:t>
+              <a:t>4/15/18</a:t>
             </a:fld>
             <a:endParaRPr lang="en-US"/>
           </a:p>
@@ -638,7 +655,7 @@
           <a:p>
             <a:fld id="{91FD018C-AC80-4D60-BFEC-75D7D34C589D}" type="datetimeFigureOut">
               <a:rPr lang="en-US" smtClean="0"/>
-              <a:t>2/26/2018</a:t>
+              <a:t>4/15/18</a:t>
             </a:fld>
             <a:endParaRPr lang="en-US"/>
           </a:p>
@@ -808,7 +825,7 @@
           <a:p>
             <a:fld id="{91FD018C-AC80-4D60-BFEC-75D7D34C589D}" type="datetimeFigureOut">
               <a:rPr lang="en-US" smtClean="0"/>
-              <a:t>2/26/2018</a:t>
+              <a:t>4/15/18</a:t>
             </a:fld>
             <a:endParaRPr lang="en-US"/>
           </a:p>
@@ -1054,7 +1071,7 @@
           <a:p>
             <a:fld id="{91FD018C-AC80-4D60-BFEC-75D7D34C589D}" type="datetimeFigureOut">
               <a:rPr lang="en-US" smtClean="0"/>
-              <a:t>2/26/2018</a:t>
+              <a:t>4/15/18</a:t>
             </a:fld>
             <a:endParaRPr lang="en-US"/>
           </a:p>
@@ -1342,7 +1359,7 @@
           <a:p>
             <a:fld id="{91FD018C-AC80-4D60-BFEC-75D7D34C589D}" type="datetimeFigureOut">
               <a:rPr lang="en-US" smtClean="0"/>
-              <a:t>2/26/2018</a:t>
+              <a:t>4/15/18</a:t>
             </a:fld>
             <a:endParaRPr lang="en-US"/>
           </a:p>
@@ -1769,7 +1786,7 @@
           <a:p>
             <a:fld id="{91FD018C-AC80-4D60-BFEC-75D7D34C589D}" type="datetimeFigureOut">
               <a:rPr lang="en-US" smtClean="0"/>
-              <a:t>2/26/2018</a:t>
+              <a:t>4/15/18</a:t>
             </a:fld>
             <a:endParaRPr lang="en-US"/>
           </a:p>
@@ -1887,7 +1904,7 @@
           <a:p>
             <a:fld id="{91FD018C-AC80-4D60-BFEC-75D7D34C589D}" type="datetimeFigureOut">
               <a:rPr lang="en-US" smtClean="0"/>
-              <a:t>2/26/2018</a:t>
+              <a:t>4/15/18</a:t>
             </a:fld>
             <a:endParaRPr lang="en-US"/>
           </a:p>
@@ -1982,7 +1999,7 @@
           <a:p>
             <a:fld id="{91FD018C-AC80-4D60-BFEC-75D7D34C589D}" type="datetimeFigureOut">
               <a:rPr lang="en-US" smtClean="0"/>
-              <a:t>2/26/2018</a:t>
+              <a:t>4/15/18</a:t>
             </a:fld>
             <a:endParaRPr lang="en-US"/>
           </a:p>
@@ -2259,7 +2276,7 @@
           <a:p>
             <a:fld id="{91FD018C-AC80-4D60-BFEC-75D7D34C589D}" type="datetimeFigureOut">
               <a:rPr lang="en-US" smtClean="0"/>
-              <a:t>2/26/2018</a:t>
+              <a:t>4/15/18</a:t>
             </a:fld>
             <a:endParaRPr lang="en-US"/>
           </a:p>
@@ -2512,7 +2529,7 @@
           <a:p>
             <a:fld id="{91FD018C-AC80-4D60-BFEC-75D7D34C589D}" type="datetimeFigureOut">
               <a:rPr lang="en-US" smtClean="0"/>
-              <a:t>2/26/2018</a:t>
+              <a:t>4/15/18</a:t>
             </a:fld>
             <a:endParaRPr lang="en-US"/>
           </a:p>
@@ -2725,7 +2742,7 @@
           <a:p>
             <a:fld id="{91FD018C-AC80-4D60-BFEC-75D7D34C589D}" type="datetimeFigureOut">
               <a:rPr lang="en-US" smtClean="0"/>
-              <a:t>2/26/2018</a:t>
+              <a:t>4/15/18</a:t>
             </a:fld>
             <a:endParaRPr lang="en-US"/>
           </a:p>
@@ -3100,527 +3117,484 @@
           <a:chExt cx="0" cy="0"/>
         </a:xfrm>
       </p:grpSpPr>
-      <p:grpSp>
-        <p:nvGrpSpPr>
-          <p:cNvPr id="6" name="Group 5"/>
-          <p:cNvGrpSpPr/>
+      <p:pic>
+        <p:nvPicPr>
+          <p:cNvPr id="2" name="Picture 1"/>
+          <p:cNvPicPr>
+            <a:picLocks noChangeAspect="1"/>
+          </p:cNvPicPr>
           <p:nvPr/>
-        </p:nvGrpSpPr>
-        <p:grpSpPr>
+        </p:nvPicPr>
+        <p:blipFill>
+          <a:blip r:embed="rId2">
+            <a:extLst>
+              <a:ext uri="{28A0092B-C50C-407E-A947-70E740481C1C}">
+                <a14:useLocalDpi xmlns:a14="http://schemas.microsoft.com/office/drawing/2010/main" val="0"/>
+              </a:ext>
+            </a:extLst>
+          </a:blip>
+          <a:stretch>
+            <a:fillRect/>
+          </a:stretch>
+        </p:blipFill>
+        <p:spPr>
           <a:xfrm>
-            <a:off x="18307751" y="3321465"/>
-            <a:ext cx="5397892" cy="12299535"/>
-            <a:chOff x="18307754" y="3321465"/>
-            <a:chExt cx="3097468" cy="12299535"/>
+            <a:off x="1986172" y="685800"/>
+            <a:ext cx="16454228" cy="16611600"/>
           </a:xfrm>
-        </p:grpSpPr>
-        <p:sp>
-          <p:nvSpPr>
-            <p:cNvPr id="4" name="Rectangle 3"/>
-            <p:cNvSpPr/>
-            <p:nvPr/>
-          </p:nvSpPr>
-          <p:spPr>
-            <a:xfrm>
-              <a:off x="18311200" y="3321465"/>
-              <a:ext cx="77925" cy="717135"/>
-            </a:xfrm>
-            <a:prstGeom prst="rect">
-              <a:avLst/>
-            </a:prstGeom>
-            <a:solidFill>
-              <a:schemeClr val="tx1"/>
-            </a:solidFill>
-            <a:ln>
-              <a:noFill/>
-            </a:ln>
-          </p:spPr>
-          <p:style>
-            <a:lnRef idx="2">
-              <a:schemeClr val="accent1">
-                <a:shade val="50000"/>
-              </a:schemeClr>
-            </a:lnRef>
-            <a:fillRef idx="1">
-              <a:schemeClr val="accent1"/>
-            </a:fillRef>
-            <a:effectRef idx="0">
-              <a:schemeClr val="accent1"/>
-            </a:effectRef>
-            <a:fontRef idx="minor">
-              <a:schemeClr val="lt1"/>
-            </a:fontRef>
-          </p:style>
-          <p:txBody>
-            <a:bodyPr lIns="261253" tIns="130627" rIns="261253" bIns="130627" spcCol="0" rtlCol="0" anchor="ctr"/>
-            <a:lstStyle/>
-            <a:p>
-              <a:pPr algn="ctr"/>
-              <a:endParaRPr lang="en-US"/>
-            </a:p>
-          </p:txBody>
-        </p:sp>
-        <p:sp>
-          <p:nvSpPr>
-            <p:cNvPr id="5" name="TextBox 4"/>
-            <p:cNvSpPr txBox="1"/>
-            <p:nvPr/>
-          </p:nvSpPr>
-          <p:spPr>
-            <a:xfrm>
-              <a:off x="18388289" y="3360003"/>
-              <a:ext cx="2487951" cy="461665"/>
-            </a:xfrm>
-            <a:prstGeom prst="rect">
-              <a:avLst/>
-            </a:prstGeom>
+          <a:prstGeom prst="rect">
+            <a:avLst/>
+          </a:prstGeom>
+        </p:spPr>
+      </p:pic>
+      <p:sp>
+        <p:nvSpPr>
+          <p:cNvPr id="4" name="Rectangle 3"/>
+          <p:cNvSpPr/>
+          <p:nvPr/>
+        </p:nvSpPr>
+        <p:spPr>
+          <a:xfrm>
+            <a:off x="18313756" y="3321465"/>
+            <a:ext cx="126642" cy="869534"/>
+          </a:xfrm>
+          <a:prstGeom prst="rect">
+            <a:avLst/>
+          </a:prstGeom>
+          <a:solidFill>
+            <a:schemeClr val="tx1"/>
+          </a:solidFill>
+          <a:ln>
             <a:noFill/>
-          </p:spPr>
-          <p:txBody>
-            <a:bodyPr wrap="square" rtlCol="0">
-              <a:spAutoFit/>
-            </a:bodyPr>
-            <a:lstStyle/>
-            <a:p>
-              <a:r>
-                <a:rPr lang="en-US" sz="2400" dirty="0" smtClean="0"/>
-                <a:t>Europe C→T </a:t>
-              </a:r>
-              <a:r>
-                <a:rPr lang="en-US" sz="2400" dirty="0" smtClean="0"/>
-                <a:t>enriched </a:t>
-              </a:r>
-              <a:r>
-                <a:rPr lang="en-US" sz="2400" dirty="0" smtClean="0"/>
-                <a:t>(1)</a:t>
-              </a:r>
-              <a:endParaRPr lang="en-US" sz="2400" dirty="0"/>
-            </a:p>
-          </p:txBody>
-        </p:sp>
-        <p:sp>
-          <p:nvSpPr>
-            <p:cNvPr id="10" name="Rectangle 9"/>
-            <p:cNvSpPr/>
-            <p:nvPr/>
-          </p:nvSpPr>
-          <p:spPr>
-            <a:xfrm>
-              <a:off x="18311202" y="6553199"/>
-              <a:ext cx="77925" cy="309265"/>
-            </a:xfrm>
-            <a:prstGeom prst="rect">
-              <a:avLst/>
-            </a:prstGeom>
-            <a:solidFill>
-              <a:schemeClr val="tx1"/>
-            </a:solidFill>
-            <a:ln>
-              <a:noFill/>
-            </a:ln>
-          </p:spPr>
-          <p:style>
-            <a:lnRef idx="2">
-              <a:schemeClr val="accent1">
-                <a:shade val="50000"/>
-              </a:schemeClr>
-            </a:lnRef>
-            <a:fillRef idx="1">
-              <a:schemeClr val="accent1"/>
-            </a:fillRef>
-            <a:effectRef idx="0">
-              <a:schemeClr val="accent1"/>
-            </a:effectRef>
-            <a:fontRef idx="minor">
-              <a:schemeClr val="lt1"/>
-            </a:fontRef>
-          </p:style>
-          <p:txBody>
-            <a:bodyPr lIns="261253" tIns="130627" rIns="261253" bIns="130627" spcCol="0" rtlCol="0" anchor="ctr"/>
-            <a:lstStyle/>
-            <a:p>
-              <a:pPr algn="ctr"/>
-              <a:endParaRPr lang="en-US"/>
-            </a:p>
-          </p:txBody>
-        </p:sp>
-        <p:sp>
-          <p:nvSpPr>
-            <p:cNvPr id="11" name="TextBox 10"/>
-            <p:cNvSpPr txBox="1"/>
-            <p:nvPr/>
-          </p:nvSpPr>
-          <p:spPr>
-            <a:xfrm>
-              <a:off x="18427596" y="6472535"/>
-              <a:ext cx="2640351" cy="461665"/>
-            </a:xfrm>
-            <a:prstGeom prst="rect">
-              <a:avLst/>
-            </a:prstGeom>
+          </a:ln>
+        </p:spPr>
+        <p:style>
+          <a:lnRef idx="2">
+            <a:schemeClr val="accent1">
+              <a:shade val="50000"/>
+            </a:schemeClr>
+          </a:lnRef>
+          <a:fillRef idx="1">
+            <a:schemeClr val="accent1"/>
+          </a:fillRef>
+          <a:effectRef idx="0">
+            <a:schemeClr val="accent1"/>
+          </a:effectRef>
+          <a:fontRef idx="minor">
+            <a:schemeClr val="lt1"/>
+          </a:fontRef>
+        </p:style>
+        <p:txBody>
+          <a:bodyPr lIns="261253" tIns="130627" rIns="261253" bIns="130627" spcCol="0" rtlCol="0" anchor="ctr"/>
+          <a:lstStyle/>
+          <a:p>
+            <a:pPr algn="ctr"/>
+            <a:endParaRPr lang="en-US"/>
+          </a:p>
+        </p:txBody>
+      </p:sp>
+      <p:sp>
+        <p:nvSpPr>
+          <p:cNvPr id="5" name="TextBox 4"/>
+          <p:cNvSpPr txBox="1"/>
+          <p:nvPr/>
+        </p:nvSpPr>
+        <p:spPr>
+          <a:xfrm>
+            <a:off x="18448098" y="3500735"/>
+            <a:ext cx="4335700" cy="461665"/>
+          </a:xfrm>
+          <a:prstGeom prst="rect">
+            <a:avLst/>
+          </a:prstGeom>
+          <a:noFill/>
+        </p:spPr>
+        <p:txBody>
+          <a:bodyPr wrap="square" rtlCol="0">
+            <a:spAutoFit/>
+          </a:bodyPr>
+          <a:lstStyle/>
+          <a:p>
+            <a:r>
+              <a:rPr lang="en-US" sz="2400" dirty="0" smtClean="0"/>
+              <a:t>Europe C→T enriched </a:t>
+            </a:r>
+            <a:r>
+              <a:rPr lang="en-US" sz="2400" dirty="0" smtClean="0"/>
+              <a:t>(#1</a:t>
+            </a:r>
+            <a:r>
+              <a:rPr lang="en-US" sz="2400" dirty="0" smtClean="0"/>
+              <a:t>)</a:t>
+            </a:r>
+            <a:endParaRPr lang="en-US" sz="2400" dirty="0"/>
+          </a:p>
+        </p:txBody>
+      </p:sp>
+      <p:sp>
+        <p:nvSpPr>
+          <p:cNvPr id="10" name="Rectangle 9"/>
+          <p:cNvSpPr/>
+          <p:nvPr/>
+        </p:nvSpPr>
+        <p:spPr>
+          <a:xfrm>
+            <a:off x="18307751" y="4648199"/>
+            <a:ext cx="141807" cy="614065"/>
+          </a:xfrm>
+          <a:prstGeom prst="rect">
+            <a:avLst/>
+          </a:prstGeom>
+          <a:solidFill>
+            <a:schemeClr val="tx1"/>
+          </a:solidFill>
+          <a:ln>
             <a:noFill/>
-          </p:spPr>
-          <p:txBody>
-            <a:bodyPr wrap="square" rtlCol="0">
-              <a:spAutoFit/>
-            </a:bodyPr>
-            <a:lstStyle/>
-            <a:p>
-              <a:r>
-                <a:rPr lang="en-US" sz="2400" dirty="0" smtClean="0"/>
-                <a:t>Japan enriched (4a)</a:t>
-              </a:r>
-              <a:endParaRPr lang="en-US" sz="2400" dirty="0"/>
-            </a:p>
-          </p:txBody>
-        </p:sp>
-        <p:sp>
-          <p:nvSpPr>
-            <p:cNvPr id="12" name="Rectangle 11"/>
-            <p:cNvSpPr/>
-            <p:nvPr/>
-          </p:nvSpPr>
-          <p:spPr>
-            <a:xfrm>
-              <a:off x="18311201" y="4114799"/>
-              <a:ext cx="77924" cy="381001"/>
-            </a:xfrm>
-            <a:prstGeom prst="rect">
-              <a:avLst/>
-            </a:prstGeom>
-            <a:solidFill>
-              <a:schemeClr val="tx1"/>
-            </a:solidFill>
-            <a:ln>
-              <a:noFill/>
-            </a:ln>
-          </p:spPr>
-          <p:style>
-            <a:lnRef idx="2">
-              <a:schemeClr val="accent1">
-                <a:shade val="50000"/>
-              </a:schemeClr>
-            </a:lnRef>
-            <a:fillRef idx="1">
-              <a:schemeClr val="accent1"/>
-            </a:fillRef>
-            <a:effectRef idx="0">
-              <a:schemeClr val="accent1"/>
-            </a:effectRef>
-            <a:fontRef idx="minor">
-              <a:schemeClr val="lt1"/>
-            </a:fontRef>
-          </p:style>
-          <p:txBody>
-            <a:bodyPr lIns="261253" tIns="130627" rIns="261253" bIns="130627" spcCol="0" rtlCol="0" anchor="ctr"/>
-            <a:lstStyle/>
-            <a:p>
-              <a:pPr algn="ctr"/>
-              <a:endParaRPr lang="en-US"/>
-            </a:p>
-          </p:txBody>
-        </p:sp>
-        <p:sp>
-          <p:nvSpPr>
-            <p:cNvPr id="13" name="TextBox 12"/>
-            <p:cNvSpPr txBox="1"/>
-            <p:nvPr/>
-          </p:nvSpPr>
-          <p:spPr>
-            <a:xfrm>
-              <a:off x="18388289" y="4110335"/>
-              <a:ext cx="2487951" cy="461665"/>
-            </a:xfrm>
-            <a:prstGeom prst="rect">
-              <a:avLst/>
-            </a:prstGeom>
+          </a:ln>
+        </p:spPr>
+        <p:style>
+          <a:lnRef idx="2">
+            <a:schemeClr val="accent1">
+              <a:shade val="50000"/>
+            </a:schemeClr>
+          </a:lnRef>
+          <a:fillRef idx="1">
+            <a:schemeClr val="accent1"/>
+          </a:fillRef>
+          <a:effectRef idx="0">
+            <a:schemeClr val="accent1"/>
+          </a:effectRef>
+          <a:fontRef idx="minor">
+            <a:schemeClr val="lt1"/>
+          </a:fontRef>
+        </p:style>
+        <p:txBody>
+          <a:bodyPr lIns="261253" tIns="130627" rIns="261253" bIns="130627" spcCol="0" rtlCol="0" anchor="ctr"/>
+          <a:lstStyle/>
+          <a:p>
+            <a:pPr algn="ctr"/>
+            <a:endParaRPr lang="en-US"/>
+          </a:p>
+        </p:txBody>
+      </p:sp>
+      <p:sp>
+        <p:nvSpPr>
+          <p:cNvPr id="11" name="TextBox 10"/>
+          <p:cNvSpPr txBox="1"/>
+          <p:nvPr/>
+        </p:nvSpPr>
+        <p:spPr>
+          <a:xfrm>
+            <a:off x="18516597" y="4800600"/>
+            <a:ext cx="4601284" cy="461665"/>
+          </a:xfrm>
+          <a:prstGeom prst="rect">
+            <a:avLst/>
+          </a:prstGeom>
+          <a:noFill/>
+        </p:spPr>
+        <p:txBody>
+          <a:bodyPr wrap="square" rtlCol="0">
+            <a:spAutoFit/>
+          </a:bodyPr>
+          <a:lstStyle/>
+          <a:p>
+            <a:r>
+              <a:rPr lang="en-US" sz="2400" dirty="0" smtClean="0"/>
+              <a:t>Japan enriched </a:t>
+            </a:r>
+            <a:r>
+              <a:rPr lang="en-US" sz="2400" dirty="0" smtClean="0"/>
+              <a:t>(#3a, #3b)</a:t>
+            </a:r>
+            <a:endParaRPr lang="en-US" sz="2400" dirty="0"/>
+          </a:p>
+        </p:txBody>
+      </p:sp>
+      <p:sp>
+        <p:nvSpPr>
+          <p:cNvPr id="12" name="Rectangle 11"/>
+          <p:cNvSpPr/>
+          <p:nvPr/>
+        </p:nvSpPr>
+        <p:spPr>
+          <a:xfrm>
+            <a:off x="18307751" y="4271667"/>
+            <a:ext cx="132647" cy="300332"/>
+          </a:xfrm>
+          <a:prstGeom prst="rect">
+            <a:avLst/>
+          </a:prstGeom>
+          <a:solidFill>
+            <a:schemeClr val="tx1"/>
+          </a:solidFill>
+          <a:ln>
             <a:noFill/>
-          </p:spPr>
-          <p:txBody>
-            <a:bodyPr wrap="square" rtlCol="0">
-              <a:spAutoFit/>
-            </a:bodyPr>
-            <a:lstStyle/>
-            <a:p>
-              <a:r>
-                <a:rPr lang="en-US" sz="2400" dirty="0" smtClean="0"/>
-                <a:t>Asia </a:t>
-              </a:r>
-              <a:r>
-                <a:rPr lang="en-US" sz="2400" dirty="0" smtClean="0"/>
-                <a:t>enriched </a:t>
-              </a:r>
-              <a:r>
-                <a:rPr lang="en-US" sz="2400" dirty="0" smtClean="0"/>
-                <a:t>(2)</a:t>
-              </a:r>
-              <a:endParaRPr lang="en-US" sz="2400" dirty="0"/>
-            </a:p>
-          </p:txBody>
-        </p:sp>
-        <p:sp>
-          <p:nvSpPr>
-            <p:cNvPr id="14" name="Rectangle 13"/>
-            <p:cNvSpPr/>
-            <p:nvPr/>
-          </p:nvSpPr>
-          <p:spPr>
-            <a:xfrm>
-              <a:off x="18307754" y="4572000"/>
-              <a:ext cx="81372" cy="421674"/>
-            </a:xfrm>
-            <a:prstGeom prst="rect">
-              <a:avLst/>
-            </a:prstGeom>
-            <a:solidFill>
-              <a:schemeClr val="tx1"/>
-            </a:solidFill>
-            <a:ln>
-              <a:noFill/>
-            </a:ln>
-          </p:spPr>
-          <p:style>
-            <a:lnRef idx="2">
-              <a:schemeClr val="accent1">
-                <a:shade val="50000"/>
-              </a:schemeClr>
-            </a:lnRef>
-            <a:fillRef idx="1">
-              <a:schemeClr val="accent1"/>
-            </a:fillRef>
-            <a:effectRef idx="0">
-              <a:schemeClr val="accent1"/>
-            </a:effectRef>
-            <a:fontRef idx="minor">
-              <a:schemeClr val="lt1"/>
-            </a:fontRef>
-          </p:style>
-          <p:txBody>
-            <a:bodyPr lIns="261253" tIns="130627" rIns="261253" bIns="130627" spcCol="0" rtlCol="0" anchor="ctr"/>
-            <a:lstStyle/>
-            <a:p>
-              <a:pPr algn="ctr"/>
-              <a:endParaRPr lang="en-US"/>
-            </a:p>
-          </p:txBody>
-        </p:sp>
-        <p:sp>
-          <p:nvSpPr>
-            <p:cNvPr id="15" name="TextBox 14"/>
-            <p:cNvSpPr txBox="1"/>
-            <p:nvPr/>
-          </p:nvSpPr>
-          <p:spPr>
-            <a:xfrm>
-              <a:off x="18388289" y="4567535"/>
-              <a:ext cx="2487951" cy="461665"/>
-            </a:xfrm>
-            <a:prstGeom prst="rect">
-              <a:avLst/>
-            </a:prstGeom>
+          </a:ln>
+        </p:spPr>
+        <p:style>
+          <a:lnRef idx="2">
+            <a:schemeClr val="accent1">
+              <a:shade val="50000"/>
+            </a:schemeClr>
+          </a:lnRef>
+          <a:fillRef idx="1">
+            <a:schemeClr val="accent1"/>
+          </a:fillRef>
+          <a:effectRef idx="0">
+            <a:schemeClr val="accent1"/>
+          </a:effectRef>
+          <a:fontRef idx="minor">
+            <a:schemeClr val="lt1"/>
+          </a:fontRef>
+        </p:style>
+        <p:txBody>
+          <a:bodyPr lIns="261253" tIns="130627" rIns="261253" bIns="130627" spcCol="0" rtlCol="0" anchor="ctr"/>
+          <a:lstStyle/>
+          <a:p>
+            <a:pPr algn="ctr"/>
+            <a:endParaRPr lang="en-US"/>
+          </a:p>
+        </p:txBody>
+      </p:sp>
+      <p:sp>
+        <p:nvSpPr>
+          <p:cNvPr id="13" name="TextBox 12"/>
+          <p:cNvSpPr txBox="1"/>
+          <p:nvPr/>
+        </p:nvSpPr>
+        <p:spPr>
+          <a:xfrm>
+            <a:off x="18448098" y="4262735"/>
+            <a:ext cx="4335700" cy="461665"/>
+          </a:xfrm>
+          <a:prstGeom prst="rect">
+            <a:avLst/>
+          </a:prstGeom>
+          <a:noFill/>
+        </p:spPr>
+        <p:txBody>
+          <a:bodyPr wrap="square" rtlCol="0">
+            <a:spAutoFit/>
+          </a:bodyPr>
+          <a:lstStyle/>
+          <a:p>
+            <a:r>
+              <a:rPr lang="en-US" sz="2400" dirty="0" smtClean="0"/>
+              <a:t>Asia enriched </a:t>
+            </a:r>
+            <a:r>
+              <a:rPr lang="en-US" sz="2400" dirty="0" smtClean="0"/>
+              <a:t>(#2</a:t>
+            </a:r>
+            <a:r>
+              <a:rPr lang="en-US" sz="2400" dirty="0" smtClean="0"/>
+              <a:t>)</a:t>
+            </a:r>
+            <a:endParaRPr lang="en-US" sz="2400" dirty="0"/>
+          </a:p>
+        </p:txBody>
+      </p:sp>
+      <p:sp>
+        <p:nvSpPr>
+          <p:cNvPr id="14" name="Rectangle 13"/>
+          <p:cNvSpPr/>
+          <p:nvPr/>
+        </p:nvSpPr>
+        <p:spPr>
+          <a:xfrm>
+            <a:off x="18307751" y="5715000"/>
+            <a:ext cx="141805" cy="421674"/>
+          </a:xfrm>
+          <a:prstGeom prst="rect">
+            <a:avLst/>
+          </a:prstGeom>
+          <a:solidFill>
+            <a:schemeClr val="tx1"/>
+          </a:solidFill>
+          <a:ln>
             <a:noFill/>
-          </p:spPr>
-          <p:txBody>
-            <a:bodyPr wrap="square" rtlCol="0">
-              <a:spAutoFit/>
-            </a:bodyPr>
-            <a:lstStyle/>
-            <a:p>
-              <a:r>
-                <a:rPr lang="en-US" sz="2400" dirty="0" smtClean="0"/>
-                <a:t>CpG transitions (3)</a:t>
-              </a:r>
-              <a:endParaRPr lang="en-US" sz="2400" dirty="0"/>
-            </a:p>
-          </p:txBody>
-        </p:sp>
-        <p:sp>
-          <p:nvSpPr>
-            <p:cNvPr id="18" name="Rectangle 17"/>
-            <p:cNvSpPr/>
-            <p:nvPr/>
-          </p:nvSpPr>
-          <p:spPr>
-            <a:xfrm>
-              <a:off x="18311202" y="14748304"/>
-              <a:ext cx="77926" cy="339296"/>
-            </a:xfrm>
-            <a:prstGeom prst="rect">
-              <a:avLst/>
-            </a:prstGeom>
-            <a:solidFill>
-              <a:schemeClr val="tx1"/>
-            </a:solidFill>
-            <a:ln>
-              <a:noFill/>
-            </a:ln>
-          </p:spPr>
-          <p:style>
-            <a:lnRef idx="2">
-              <a:schemeClr val="accent1">
-                <a:shade val="50000"/>
-              </a:schemeClr>
-            </a:lnRef>
-            <a:fillRef idx="1">
-              <a:schemeClr val="accent1"/>
-            </a:fillRef>
-            <a:effectRef idx="0">
-              <a:schemeClr val="accent1"/>
-            </a:effectRef>
-            <a:fontRef idx="minor">
-              <a:schemeClr val="lt1"/>
-            </a:fontRef>
-          </p:style>
-          <p:txBody>
-            <a:bodyPr lIns="261253" tIns="130627" rIns="261253" bIns="130627" spcCol="0" rtlCol="0" anchor="ctr"/>
-            <a:lstStyle/>
-            <a:p>
-              <a:pPr algn="ctr"/>
-              <a:endParaRPr lang="en-US"/>
-            </a:p>
-          </p:txBody>
-        </p:sp>
-        <p:sp>
-          <p:nvSpPr>
-            <p:cNvPr id="19" name="TextBox 18"/>
-            <p:cNvSpPr txBox="1"/>
-            <p:nvPr/>
-          </p:nvSpPr>
-          <p:spPr>
-            <a:xfrm>
-              <a:off x="18383871" y="14702135"/>
-              <a:ext cx="2640351" cy="461665"/>
-            </a:xfrm>
-            <a:prstGeom prst="rect">
-              <a:avLst/>
-            </a:prstGeom>
+          </a:ln>
+        </p:spPr>
+        <p:style>
+          <a:lnRef idx="2">
+            <a:schemeClr val="accent1">
+              <a:shade val="50000"/>
+            </a:schemeClr>
+          </a:lnRef>
+          <a:fillRef idx="1">
+            <a:schemeClr val="accent1"/>
+          </a:fillRef>
+          <a:effectRef idx="0">
+            <a:schemeClr val="accent1"/>
+          </a:effectRef>
+          <a:fontRef idx="minor">
+            <a:schemeClr val="lt1"/>
+          </a:fontRef>
+        </p:style>
+        <p:txBody>
+          <a:bodyPr lIns="261253" tIns="130627" rIns="261253" bIns="130627" spcCol="0" rtlCol="0" anchor="ctr"/>
+          <a:lstStyle/>
+          <a:p>
+            <a:pPr algn="ctr"/>
+            <a:endParaRPr lang="en-US"/>
+          </a:p>
+        </p:txBody>
+      </p:sp>
+      <p:sp>
+        <p:nvSpPr>
+          <p:cNvPr id="15" name="TextBox 14"/>
+          <p:cNvSpPr txBox="1"/>
+          <p:nvPr/>
+        </p:nvSpPr>
+        <p:spPr>
+          <a:xfrm>
+            <a:off x="18448098" y="5710535"/>
+            <a:ext cx="4335700" cy="461665"/>
+          </a:xfrm>
+          <a:prstGeom prst="rect">
+            <a:avLst/>
+          </a:prstGeom>
+          <a:noFill/>
+        </p:spPr>
+        <p:txBody>
+          <a:bodyPr wrap="square" rtlCol="0">
+            <a:spAutoFit/>
+          </a:bodyPr>
+          <a:lstStyle/>
+          <a:p>
+            <a:r>
+              <a:rPr lang="en-US" sz="2400" dirty="0" smtClean="0"/>
+              <a:t>CpG transitions </a:t>
+            </a:r>
+            <a:r>
+              <a:rPr lang="en-US" sz="2400" dirty="0" smtClean="0"/>
+              <a:t>(#4)</a:t>
+            </a:r>
+            <a:endParaRPr lang="en-US" sz="2400" dirty="0"/>
+          </a:p>
+        </p:txBody>
+      </p:sp>
+      <p:sp>
+        <p:nvSpPr>
+          <p:cNvPr id="20" name="Rectangle 19"/>
+          <p:cNvSpPr/>
+          <p:nvPr/>
+        </p:nvSpPr>
+        <p:spPr>
+          <a:xfrm>
+            <a:off x="18313758" y="15163800"/>
+            <a:ext cx="135802" cy="457200"/>
+          </a:xfrm>
+          <a:prstGeom prst="rect">
+            <a:avLst/>
+          </a:prstGeom>
+          <a:solidFill>
+            <a:schemeClr val="bg1">
+              <a:lumMod val="75000"/>
+            </a:schemeClr>
+          </a:solidFill>
+          <a:ln>
             <a:noFill/>
-          </p:spPr>
-          <p:txBody>
-            <a:bodyPr wrap="square" rtlCol="0">
-              <a:spAutoFit/>
-            </a:bodyPr>
-            <a:lstStyle/>
-            <a:p>
-              <a:r>
-                <a:rPr lang="en-US" sz="2400" dirty="0" smtClean="0"/>
-                <a:t>Japan enriched (4b)</a:t>
-              </a:r>
-              <a:endParaRPr lang="en-US" sz="2400" dirty="0"/>
-            </a:p>
-          </p:txBody>
-        </p:sp>
-        <p:sp>
-          <p:nvSpPr>
-            <p:cNvPr id="20" name="Rectangle 19"/>
-            <p:cNvSpPr/>
-            <p:nvPr/>
-          </p:nvSpPr>
-          <p:spPr>
-            <a:xfrm>
-              <a:off x="18311201" y="15163800"/>
-              <a:ext cx="77927" cy="457200"/>
-            </a:xfrm>
-            <a:prstGeom prst="rect">
-              <a:avLst/>
-            </a:prstGeom>
-            <a:solidFill>
-              <a:schemeClr val="bg1">
-                <a:lumMod val="75000"/>
-              </a:schemeClr>
-            </a:solidFill>
-            <a:ln>
-              <a:noFill/>
-            </a:ln>
-          </p:spPr>
-          <p:style>
-            <a:lnRef idx="2">
-              <a:schemeClr val="accent1">
-                <a:shade val="50000"/>
-              </a:schemeClr>
-            </a:lnRef>
-            <a:fillRef idx="1">
-              <a:schemeClr val="accent1"/>
-            </a:fillRef>
-            <a:effectRef idx="0">
-              <a:schemeClr val="accent1"/>
-            </a:effectRef>
-            <a:fontRef idx="minor">
-              <a:schemeClr val="lt1"/>
-            </a:fontRef>
-          </p:style>
-          <p:txBody>
-            <a:bodyPr lIns="261253" tIns="130627" rIns="261253" bIns="130627" spcCol="0" rtlCol="0" anchor="ctr"/>
-            <a:lstStyle/>
-            <a:p>
-              <a:pPr algn="ctr"/>
-              <a:endParaRPr lang="en-US"/>
-            </a:p>
-          </p:txBody>
-        </p:sp>
-        <p:sp>
-          <p:nvSpPr>
-            <p:cNvPr id="21" name="TextBox 20"/>
-            <p:cNvSpPr txBox="1"/>
-            <p:nvPr/>
-          </p:nvSpPr>
-          <p:spPr>
-            <a:xfrm>
-              <a:off x="18383871" y="15159335"/>
-              <a:ext cx="3021351" cy="461665"/>
-            </a:xfrm>
-            <a:prstGeom prst="rect">
-              <a:avLst/>
-            </a:prstGeom>
-            <a:noFill/>
-          </p:spPr>
-          <p:txBody>
-            <a:bodyPr wrap="square" rtlCol="0">
-              <a:spAutoFit/>
-            </a:bodyPr>
-            <a:lstStyle/>
-            <a:p>
-              <a:r>
-                <a:rPr lang="en-US" sz="2400" dirty="0" smtClean="0">
-                  <a:solidFill>
-                    <a:schemeClr val="bg1">
-                      <a:lumMod val="50000"/>
-                    </a:schemeClr>
-                  </a:solidFill>
-                </a:rPr>
-                <a:t>CpG transversions</a:t>
-              </a:r>
-              <a:r>
-                <a:rPr lang="en-US" sz="2400" dirty="0">
-                  <a:solidFill>
-                    <a:schemeClr val="bg1">
-                      <a:lumMod val="50000"/>
-                    </a:schemeClr>
-                  </a:solidFill>
-                </a:rPr>
-                <a:t> </a:t>
-              </a:r>
-              <a:r>
-                <a:rPr lang="en-US" sz="2400" dirty="0" smtClean="0">
-                  <a:solidFill>
-                    <a:schemeClr val="bg1">
-                      <a:lumMod val="50000"/>
-                    </a:schemeClr>
-                  </a:solidFill>
-                </a:rPr>
-                <a:t>(5)</a:t>
-              </a:r>
-              <a:endParaRPr lang="en-US" sz="2400" dirty="0">
+          </a:ln>
+        </p:spPr>
+        <p:style>
+          <a:lnRef idx="2">
+            <a:schemeClr val="accent1">
+              <a:shade val="50000"/>
+            </a:schemeClr>
+          </a:lnRef>
+          <a:fillRef idx="1">
+            <a:schemeClr val="accent1"/>
+          </a:fillRef>
+          <a:effectRef idx="0">
+            <a:schemeClr val="accent1"/>
+          </a:effectRef>
+          <a:fontRef idx="minor">
+            <a:schemeClr val="lt1"/>
+          </a:fontRef>
+        </p:style>
+        <p:txBody>
+          <a:bodyPr lIns="261253" tIns="130627" rIns="261253" bIns="130627" spcCol="0" rtlCol="0" anchor="ctr"/>
+          <a:lstStyle/>
+          <a:p>
+            <a:pPr algn="ctr"/>
+            <a:endParaRPr lang="en-US"/>
+          </a:p>
+        </p:txBody>
+      </p:sp>
+      <p:sp>
+        <p:nvSpPr>
+          <p:cNvPr id="21" name="TextBox 20"/>
+          <p:cNvSpPr txBox="1"/>
+          <p:nvPr/>
+        </p:nvSpPr>
+        <p:spPr>
+          <a:xfrm>
+            <a:off x="18440398" y="15159335"/>
+            <a:ext cx="5265245" cy="461665"/>
+          </a:xfrm>
+          <a:prstGeom prst="rect">
+            <a:avLst/>
+          </a:prstGeom>
+          <a:noFill/>
+        </p:spPr>
+        <p:txBody>
+          <a:bodyPr wrap="square" rtlCol="0">
+            <a:spAutoFit/>
+          </a:bodyPr>
+          <a:lstStyle/>
+          <a:p>
+            <a:r>
+              <a:rPr lang="en-US" sz="2400" dirty="0" smtClean="0">
                 <a:solidFill>
                   <a:schemeClr val="bg1">
                     <a:lumMod val="50000"/>
                   </a:schemeClr>
                 </a:solidFill>
-              </a:endParaRPr>
-            </a:p>
-          </p:txBody>
-        </p:sp>
-      </p:grpSp>
+              </a:rPr>
+              <a:t>CpG transversions</a:t>
+            </a:r>
+            <a:r>
+              <a:rPr lang="en-US" sz="2400" dirty="0">
+                <a:solidFill>
+                  <a:schemeClr val="bg1">
+                    <a:lumMod val="50000"/>
+                  </a:schemeClr>
+                </a:solidFill>
+              </a:rPr>
+              <a:t> </a:t>
+            </a:r>
+            <a:r>
+              <a:rPr lang="en-US" sz="2400" dirty="0" smtClean="0">
+                <a:solidFill>
+                  <a:schemeClr val="bg1">
+                    <a:lumMod val="50000"/>
+                  </a:schemeClr>
+                </a:solidFill>
+              </a:rPr>
+              <a:t>(#5</a:t>
+            </a:r>
+            <a:r>
+              <a:rPr lang="en-US" sz="2400" dirty="0" smtClean="0">
+                <a:solidFill>
+                  <a:schemeClr val="bg1">
+                    <a:lumMod val="50000"/>
+                  </a:schemeClr>
+                </a:solidFill>
+              </a:rPr>
+              <a:t>)</a:t>
+            </a:r>
+            <a:endParaRPr lang="en-US" sz="2400" dirty="0">
+              <a:solidFill>
+                <a:schemeClr val="bg1">
+                  <a:lumMod val="50000"/>
+                </a:schemeClr>
+              </a:solidFill>
+            </a:endParaRPr>
+          </a:p>
+        </p:txBody>
+      </p:sp>
       <p:graphicFrame>
         <p:nvGraphicFramePr>
           <p:cNvPr id="7" name="Table 6"/>
@@ -3630,14 +3604,14 @@
           <p:nvPr>
             <p:extLst>
               <p:ext uri="{D42A27DB-BD31-4B8C-83A1-F6EECF244321}">
-                <p14:modId xmlns:p14="http://schemas.microsoft.com/office/powerpoint/2010/main" val="4246608672"/>
+                <p14:modId xmlns:p14="http://schemas.microsoft.com/office/powerpoint/2010/main" val="2087483757"/>
               </p:ext>
             </p:extLst>
           </p:nvPr>
         </p:nvGraphicFramePr>
         <p:xfrm>
-          <a:off x="18745200" y="7345680"/>
-          <a:ext cx="4495800" cy="7025640"/>
+          <a:off x="18592800" y="6781800"/>
+          <a:ext cx="4495800" cy="7833360"/>
         </p:xfrm>
         <a:graphic>
           <a:graphicData uri="http://schemas.openxmlformats.org/drawingml/2006/table">
@@ -3731,7 +3705,11 @@
                       </a:r>
                       <a:r>
                         <a:rPr lang="en-US" sz="2400" dirty="0" smtClean="0"/>
-                        <a:t>(1)</a:t>
+                        <a:t>(#1</a:t>
+                      </a:r>
+                      <a:r>
+                        <a:rPr lang="en-US" sz="2400" dirty="0" smtClean="0"/>
+                        <a:t>)</a:t>
                       </a:r>
                       <a:endParaRPr lang="en-US" sz="2400" dirty="0"/>
                     </a:p>
@@ -3823,7 +3801,34 @@
                       <a:pPr algn="ctr"/>
                       <a:r>
                         <a:rPr lang="en-US" sz="2000" dirty="0" smtClean="0"/>
-                        <a:t>TCC→T</a:t>
+                        <a:t>TCC→</a:t>
+                      </a:r>
+                      <a:r>
+                        <a:rPr lang="en-US" sz="2000" dirty="0" smtClean="0"/>
+                        <a:t>T</a:t>
+                      </a:r>
+                    </a:p>
+                    <a:p>
+                      <a:pPr marL="0" marR="0" indent="0" algn="ctr" defTabSz="2612532" rtl="0" eaLnBrk="1" fontAlgn="auto" latinLnBrk="0" hangingPunct="1">
+                        <a:lnSpc>
+                          <a:spcPct val="100000"/>
+                        </a:lnSpc>
+                        <a:spcBef>
+                          <a:spcPts val="0"/>
+                        </a:spcBef>
+                        <a:spcAft>
+                          <a:spcPts val="0"/>
+                        </a:spcAft>
+                        <a:buClrTx/>
+                        <a:buSzTx/>
+                        <a:buFontTx/>
+                        <a:buNone/>
+                        <a:tabLst/>
+                        <a:defRPr/>
+                      </a:pPr>
+                      <a:r>
+                        <a:rPr lang="en-US" sz="2000" dirty="0" smtClean="0"/>
+                        <a:t>GCC→T</a:t>
                       </a:r>
                     </a:p>
                   </a:txBody>
@@ -3881,15 +3886,15 @@
                       <a:pPr algn="ctr"/>
                       <a:r>
                         <a:rPr lang="en-US" sz="2400" dirty="0" smtClean="0"/>
-                        <a:t>Asia </a:t>
+                        <a:t>Asia enriched </a:t>
                       </a:r>
                       <a:r>
                         <a:rPr lang="en-US" sz="2400" dirty="0" smtClean="0"/>
-                        <a:t>enriched </a:t>
+                        <a:t>(#2</a:t>
                       </a:r>
                       <a:r>
                         <a:rPr lang="en-US" sz="2400" dirty="0" smtClean="0"/>
-                        <a:t>(2)</a:t>
+                        <a:t>)</a:t>
                       </a:r>
                       <a:endParaRPr lang="en-US" sz="2400" dirty="0"/>
                     </a:p>
@@ -4010,136 +4015,6 @@
                   </a:tcPr>
                 </a:tc>
               </a:tr>
-              <a:tr h="457200">
-                <a:tc>
-                  <a:txBody>
-                    <a:bodyPr/>
-                    <a:lstStyle/>
-                    <a:p>
-                      <a:pPr marL="0" marR="0" indent="0" algn="ctr" defTabSz="2612532" rtl="0" eaLnBrk="1" fontAlgn="auto" latinLnBrk="0" hangingPunct="1">
-                        <a:lnSpc>
-                          <a:spcPct val="100000"/>
-                        </a:lnSpc>
-                        <a:spcBef>
-                          <a:spcPts val="0"/>
-                        </a:spcBef>
-                        <a:spcAft>
-                          <a:spcPts val="0"/>
-                        </a:spcAft>
-                        <a:buClrTx/>
-                        <a:buSzTx/>
-                        <a:buFontTx/>
-                        <a:buNone/>
-                        <a:tabLst/>
-                        <a:defRPr/>
-                      </a:pPr>
-                      <a:r>
-                        <a:rPr lang="en-US" sz="2400" dirty="0" smtClean="0"/>
-                        <a:t>CpG transitions (3)</a:t>
-                      </a:r>
-                    </a:p>
-                  </a:txBody>
-                  <a:tcPr anchor="ctr">
-                    <a:lnL w="3175" cap="flat" cmpd="sng" algn="ctr">
-                      <a:solidFill>
-                        <a:schemeClr val="bg1">
-                          <a:lumMod val="65000"/>
-                        </a:schemeClr>
-                      </a:solidFill>
-                      <a:prstDash val="solid"/>
-                      <a:round/>
-                      <a:headEnd type="none" w="med" len="med"/>
-                      <a:tailEnd type="none" w="med" len="med"/>
-                    </a:lnL>
-                    <a:lnR w="3175" cap="flat" cmpd="sng" algn="ctr">
-                      <a:solidFill>
-                        <a:schemeClr val="bg1">
-                          <a:lumMod val="65000"/>
-                        </a:schemeClr>
-                      </a:solidFill>
-                      <a:prstDash val="solid"/>
-                      <a:round/>
-                      <a:headEnd type="none" w="med" len="med"/>
-                      <a:tailEnd type="none" w="med" len="med"/>
-                    </a:lnR>
-                    <a:lnT w="3175" cap="flat" cmpd="sng" algn="ctr">
-                      <a:solidFill>
-                        <a:schemeClr val="tx1"/>
-                      </a:solidFill>
-                      <a:prstDash val="solid"/>
-                      <a:round/>
-                      <a:headEnd type="none" w="med" len="med"/>
-                      <a:tailEnd type="none" w="med" len="med"/>
-                    </a:lnT>
-                    <a:lnB w="3175" cap="flat" cmpd="sng" algn="ctr">
-                      <a:solidFill>
-                        <a:schemeClr val="tx1"/>
-                      </a:solidFill>
-                      <a:prstDash val="solid"/>
-                      <a:round/>
-                      <a:headEnd type="none" w="med" len="med"/>
-                      <a:tailEnd type="none" w="med" len="med"/>
-                    </a:lnB>
-                    <a:noFill/>
-                  </a:tcPr>
-                </a:tc>
-                <a:tc>
-                  <a:txBody>
-                    <a:bodyPr/>
-                    <a:lstStyle/>
-                    <a:p>
-                      <a:pPr algn="ctr"/>
-                      <a:r>
-                        <a:rPr lang="en-US" sz="2000" dirty="0" smtClean="0"/>
-                        <a:t>*CG→T (4 types)</a:t>
-                      </a:r>
-                    </a:p>
-                  </a:txBody>
-                  <a:tcPr anchor="ctr">
-                    <a:lnL w="3175" cap="flat" cmpd="sng" algn="ctr">
-                      <a:solidFill>
-                        <a:schemeClr val="bg1">
-                          <a:lumMod val="65000"/>
-                        </a:schemeClr>
-                      </a:solidFill>
-                      <a:prstDash val="solid"/>
-                      <a:round/>
-                      <a:headEnd type="none" w="med" len="med"/>
-                      <a:tailEnd type="none" w="med" len="med"/>
-                    </a:lnL>
-                    <a:lnR w="3175" cap="flat" cmpd="sng" algn="ctr">
-                      <a:solidFill>
-                        <a:schemeClr val="bg1">
-                          <a:lumMod val="65000"/>
-                        </a:schemeClr>
-                      </a:solidFill>
-                      <a:prstDash val="solid"/>
-                      <a:round/>
-                      <a:headEnd type="none" w="med" len="med"/>
-                      <a:tailEnd type="none" w="med" len="med"/>
-                    </a:lnR>
-                    <a:lnT w="3175" cap="flat" cmpd="sng" algn="ctr">
-                      <a:solidFill>
-                        <a:schemeClr val="tx1"/>
-                      </a:solidFill>
-                      <a:prstDash val="solid"/>
-                      <a:round/>
-                      <a:headEnd type="none" w="med" len="med"/>
-                      <a:tailEnd type="none" w="med" len="med"/>
-                    </a:lnT>
-                    <a:lnB w="3175" cap="flat" cmpd="sng" algn="ctr">
-                      <a:solidFill>
-                        <a:schemeClr val="tx1"/>
-                      </a:solidFill>
-                      <a:prstDash val="solid"/>
-                      <a:round/>
-                      <a:headEnd type="none" w="med" len="med"/>
-                      <a:tailEnd type="none" w="med" len="med"/>
-                    </a:lnB>
-                    <a:noFill/>
-                  </a:tcPr>
-                </a:tc>
-              </a:tr>
               <a:tr h="807720">
                 <a:tc rowSpan="2">
                   <a:txBody>
@@ -4157,11 +4032,19 @@
                       </a:r>
                       <a:r>
                         <a:rPr lang="en-US" sz="2400" dirty="0" smtClean="0"/>
-                        <a:t>enriched (</a:t>
+                        <a:t>enriched </a:t>
                       </a:r>
                       <a:r>
                         <a:rPr lang="en-US" sz="2400" dirty="0" smtClean="0"/>
-                        <a:t>4a,  4b</a:t>
+                        <a:t>(#3a</a:t>
+                      </a:r>
+                      <a:r>
+                        <a:rPr lang="en-US" sz="2400" dirty="0" smtClean="0"/>
+                        <a:t>,  </a:t>
+                      </a:r>
+                      <a:r>
+                        <a:rPr lang="en-US" sz="2400" dirty="0" smtClean="0"/>
+                        <a:t>#3b</a:t>
                       </a:r>
                       <a:r>
                         <a:rPr lang="en-US" sz="2400" dirty="0" smtClean="0"/>
@@ -4229,11 +4112,7 @@
                       <a:pPr algn="ctr"/>
                       <a:r>
                         <a:rPr lang="en-US" sz="2000" dirty="0" smtClean="0"/>
-                        <a:t>TAT→T (a</a:t>
-                      </a:r>
-                      <a:r>
-                        <a:rPr lang="en-US" sz="2000" dirty="0" smtClean="0"/>
-                        <a:t>)</a:t>
+                        <a:t>TAT→T (a)</a:t>
                       </a:r>
                     </a:p>
                   </a:txBody>
@@ -4372,6 +4251,136 @@
                   </a:tcPr>
                 </a:tc>
               </a:tr>
+              <a:tr h="960120">
+                <a:tc>
+                  <a:txBody>
+                    <a:bodyPr/>
+                    <a:lstStyle/>
+                    <a:p>
+                      <a:pPr marL="0" marR="0" indent="0" algn="ctr" defTabSz="2612532" rtl="0" eaLnBrk="1" fontAlgn="auto" latinLnBrk="0" hangingPunct="1">
+                        <a:lnSpc>
+                          <a:spcPct val="100000"/>
+                        </a:lnSpc>
+                        <a:spcBef>
+                          <a:spcPts val="0"/>
+                        </a:spcBef>
+                        <a:spcAft>
+                          <a:spcPts val="0"/>
+                        </a:spcAft>
+                        <a:buClrTx/>
+                        <a:buSzTx/>
+                        <a:buFontTx/>
+                        <a:buNone/>
+                        <a:tabLst/>
+                        <a:defRPr/>
+                      </a:pPr>
+                      <a:r>
+                        <a:rPr lang="en-US" sz="2400" dirty="0" smtClean="0"/>
+                        <a:t>CpG transitions (#4)</a:t>
+                      </a:r>
+                    </a:p>
+                  </a:txBody>
+                  <a:tcPr anchor="ctr">
+                    <a:lnL w="3175" cap="flat" cmpd="sng" algn="ctr">
+                      <a:solidFill>
+                        <a:schemeClr val="bg1">
+                          <a:lumMod val="65000"/>
+                        </a:schemeClr>
+                      </a:solidFill>
+                      <a:prstDash val="solid"/>
+                      <a:round/>
+                      <a:headEnd type="none" w="med" len="med"/>
+                      <a:tailEnd type="none" w="med" len="med"/>
+                    </a:lnL>
+                    <a:lnR w="3175" cap="flat" cmpd="sng" algn="ctr">
+                      <a:solidFill>
+                        <a:schemeClr val="bg1">
+                          <a:lumMod val="65000"/>
+                        </a:schemeClr>
+                      </a:solidFill>
+                      <a:prstDash val="solid"/>
+                      <a:round/>
+                      <a:headEnd type="none" w="med" len="med"/>
+                      <a:tailEnd type="none" w="med" len="med"/>
+                    </a:lnR>
+                    <a:lnT w="3175" cap="flat" cmpd="sng" algn="ctr">
+                      <a:solidFill>
+                        <a:schemeClr val="tx1"/>
+                      </a:solidFill>
+                      <a:prstDash val="solid"/>
+                      <a:round/>
+                      <a:headEnd type="none" w="med" len="med"/>
+                      <a:tailEnd type="none" w="med" len="med"/>
+                    </a:lnT>
+                    <a:lnB w="3175" cap="flat" cmpd="sng" algn="ctr">
+                      <a:solidFill>
+                        <a:schemeClr val="tx1"/>
+                      </a:solidFill>
+                      <a:prstDash val="solid"/>
+                      <a:round/>
+                      <a:headEnd type="none" w="med" len="med"/>
+                      <a:tailEnd type="none" w="med" len="med"/>
+                    </a:lnB>
+                    <a:noFill/>
+                  </a:tcPr>
+                </a:tc>
+                <a:tc>
+                  <a:txBody>
+                    <a:bodyPr/>
+                    <a:lstStyle/>
+                    <a:p>
+                      <a:pPr algn="ctr"/>
+                      <a:r>
+                        <a:rPr lang="en-US" sz="2000" dirty="0" smtClean="0"/>
+                        <a:t>*CG→T (4 types)</a:t>
+                      </a:r>
+                    </a:p>
+                  </a:txBody>
+                  <a:tcPr anchor="ctr">
+                    <a:lnL w="3175" cap="flat" cmpd="sng" algn="ctr">
+                      <a:solidFill>
+                        <a:schemeClr val="bg1">
+                          <a:lumMod val="65000"/>
+                        </a:schemeClr>
+                      </a:solidFill>
+                      <a:prstDash val="solid"/>
+                      <a:round/>
+                      <a:headEnd type="none" w="med" len="med"/>
+                      <a:tailEnd type="none" w="med" len="med"/>
+                    </a:lnL>
+                    <a:lnR w="3175" cap="flat" cmpd="sng" algn="ctr">
+                      <a:solidFill>
+                        <a:schemeClr val="bg1">
+                          <a:lumMod val="65000"/>
+                        </a:schemeClr>
+                      </a:solidFill>
+                      <a:prstDash val="solid"/>
+                      <a:round/>
+                      <a:headEnd type="none" w="med" len="med"/>
+                      <a:tailEnd type="none" w="med" len="med"/>
+                    </a:lnR>
+                    <a:lnT w="3175" cap="flat" cmpd="sng" algn="ctr">
+                      <a:solidFill>
+                        <a:schemeClr val="tx1"/>
+                      </a:solidFill>
+                      <a:prstDash val="solid"/>
+                      <a:round/>
+                      <a:headEnd type="none" w="med" len="med"/>
+                      <a:tailEnd type="none" w="med" len="med"/>
+                    </a:lnT>
+                    <a:lnB w="3175" cap="flat" cmpd="sng" algn="ctr">
+                      <a:solidFill>
+                        <a:schemeClr val="tx1"/>
+                      </a:solidFill>
+                      <a:prstDash val="solid"/>
+                      <a:round/>
+                      <a:headEnd type="none" w="med" len="med"/>
+                      <a:tailEnd type="none" w="med" len="med"/>
+                    </a:lnB>
+                    <a:noFill/>
+                  </a:tcPr>
+                </a:tc>
+              </a:tr>
               <a:tr h="1188720">
                 <a:tc>
                   <a:txBody>
@@ -4381,7 +4390,15 @@
                       <a:pPr algn="ctr"/>
                       <a:r>
                         <a:rPr lang="en-US" sz="2400" dirty="0" smtClean="0"/>
-                        <a:t>CpG transversions (5)</a:t>
+                        <a:t>CpG transversions </a:t>
+                      </a:r>
+                      <a:r>
+                        <a:rPr lang="en-US" sz="2400" dirty="0" smtClean="0"/>
+                        <a:t>(#5</a:t>
+                      </a:r>
+                      <a:r>
+                        <a:rPr lang="en-US" sz="2400" dirty="0" smtClean="0"/>
+                        <a:t>)</a:t>
                       </a:r>
                       <a:endParaRPr lang="en-US" sz="2400" dirty="0"/>
                     </a:p>
@@ -4517,29 +4534,92 @@
           </a:graphicData>
         </a:graphic>
       </p:graphicFrame>
+    </p:spTree>
+    <p:extLst>
+      <p:ext uri="{BB962C8B-B14F-4D97-AF65-F5344CB8AC3E}">
+        <p14:creationId xmlns:p14="http://schemas.microsoft.com/office/powerpoint/2010/main" val="2325103837"/>
+      </p:ext>
+    </p:extLst>
+  </p:cSld>
+  <p:clrMapOvr>
+    <a:masterClrMapping/>
+  </p:clrMapOvr>
+</p:sld>
+</file>
+
+<file path=ppt/slides/slide2.xml><?xml version="1.0" encoding="utf-8"?>
+<p:sld xmlns:a="http://schemas.openxmlformats.org/drawingml/2006/main" xmlns:r="http://schemas.openxmlformats.org/officeDocument/2006/relationships" xmlns:p="http://schemas.openxmlformats.org/presentationml/2006/main">
+  <p:cSld>
+    <p:spTree>
+      <p:nvGrpSpPr>
+        <p:cNvPr id="1" name=""/>
+        <p:cNvGrpSpPr/>
+        <p:nvPr/>
+      </p:nvGrpSpPr>
+      <p:grpSpPr>
+        <a:xfrm>
+          <a:off x="0" y="0"/>
+          <a:ext cx="0" cy="0"/>
+          <a:chOff x="0" y="0"/>
+          <a:chExt cx="0" cy="0"/>
+        </a:xfrm>
+      </p:grpSpPr>
+      <p:sp>
+        <p:nvSpPr>
+          <p:cNvPr id="2" name="Title 1"/>
+          <p:cNvSpPr>
+            <a:spLocks noGrp="1"/>
+          </p:cNvSpPr>
+          <p:nvPr>
+            <p:ph type="title"/>
+          </p:nvPr>
+        </p:nvSpPr>
+        <p:spPr/>
+        <p:txBody>
+          <a:bodyPr/>
+          <a:lstStyle/>
+          <a:p>
+            <a:endParaRPr lang="en-US"/>
+          </a:p>
+        </p:txBody>
+      </p:sp>
+      <p:sp>
+        <p:nvSpPr>
+          <p:cNvPr id="3" name="Content Placeholder 2"/>
+          <p:cNvSpPr>
+            <a:spLocks noGrp="1"/>
+          </p:cNvSpPr>
+          <p:nvPr>
+            <p:ph idx="1"/>
+          </p:nvPr>
+        </p:nvSpPr>
+        <p:spPr/>
+        <p:txBody>
+          <a:bodyPr/>
+          <a:lstStyle/>
+          <a:p>
+            <a:endParaRPr lang="en-US"/>
+          </a:p>
+        </p:txBody>
+      </p:sp>
       <p:pic>
         <p:nvPicPr>
-          <p:cNvPr id="2" name="Picture 1" descr="Figure1A.pdf - Adobe Acrobat Reader DC"/>
+          <p:cNvPr id="4" name="Picture 3"/>
           <p:cNvPicPr>
             <a:picLocks noChangeAspect="1"/>
           </p:cNvPicPr>
           <p:nvPr/>
         </p:nvPicPr>
-        <p:blipFill rotWithShape="1">
-          <a:blip r:embed="rId2">
-            <a:extLst>
-              <a:ext uri="{28A0092B-C50C-407E-A947-70E740481C1C}">
-                <a14:useLocalDpi xmlns:a14="http://schemas.microsoft.com/office/drawing/2010/main" val="0"/>
-              </a:ext>
-            </a:extLst>
-          </a:blip>
-          <a:srcRect l="17709" t="12342" r="36692" b="5060"/>
-          <a:stretch/>
+        <p:blipFill>
+          <a:blip r:embed="rId2"/>
+          <a:stretch>
+            <a:fillRect/>
+          </a:stretch>
         </p:blipFill>
         <p:spPr>
           <a:xfrm>
-            <a:off x="2278354" y="731423"/>
-            <a:ext cx="16005953" cy="16413577"/>
+            <a:off x="7740650" y="3111500"/>
+            <a:ext cx="11950700" cy="12065000"/>
           </a:xfrm>
           <a:prstGeom prst="rect">
             <a:avLst/>
@@ -4549,7 +4629,7 @@
     </p:spTree>
     <p:extLst>
       <p:ext uri="{BB962C8B-B14F-4D97-AF65-F5344CB8AC3E}">
-        <p14:creationId xmlns:p14="http://schemas.microsoft.com/office/powerpoint/2010/main" val="2325103837"/>
+        <p14:creationId xmlns:p14="http://schemas.microsoft.com/office/powerpoint/2010/main" val="6140078"/>
       </p:ext>
     </p:extLst>
   </p:cSld>

</xml_diff>

<commit_message>
overhaul paper for revisions after SGDP rep
</commit_message>
<xml_diff>
--- a/paper/main_figures/Fig1A.pptx
+++ b/paper/main_figures/Fig1A.pptx
@@ -162,10 +162,9 @@
           <a:lstStyle/>
           <a:p>
             <a:r>
-              <a:rPr lang="en-US" smtClean="0"/>
+              <a:rPr lang="en-US"/>
               <a:t>Click to edit Master title style</a:t>
             </a:r>
-            <a:endParaRPr lang="en-US"/>
           </a:p>
         </p:txBody>
       </p:sp>
@@ -281,10 +280,9 @@
           </a:lstStyle>
           <a:p>
             <a:r>
-              <a:rPr lang="en-US" smtClean="0"/>
+              <a:rPr lang="en-US"/>
               <a:t>Click to edit Master subtitle style</a:t>
             </a:r>
-            <a:endParaRPr lang="en-US"/>
           </a:p>
         </p:txBody>
       </p:sp>
@@ -305,7 +303,7 @@
           <a:p>
             <a:fld id="{91FD018C-AC80-4D60-BFEC-75D7D34C589D}" type="datetimeFigureOut">
               <a:rPr lang="en-US" smtClean="0"/>
-              <a:t>4/15/18</a:t>
+              <a:t>12/21/18</a:t>
             </a:fld>
             <a:endParaRPr lang="en-US"/>
           </a:p>
@@ -399,10 +397,9 @@
           <a:lstStyle/>
           <a:p>
             <a:r>
-              <a:rPr lang="en-US" smtClean="0"/>
+              <a:rPr lang="en-US"/>
               <a:t>Click to edit Master title style</a:t>
             </a:r>
-            <a:endParaRPr lang="en-US"/>
           </a:p>
         </p:txBody>
       </p:sp>
@@ -423,38 +420,37 @@
           <a:p>
             <a:pPr lvl="0"/>
             <a:r>
-              <a:rPr lang="en-US" smtClean="0"/>
+              <a:rPr lang="en-US"/>
               <a:t>Click to edit Master text styles</a:t>
             </a:r>
           </a:p>
           <a:p>
             <a:pPr lvl="1"/>
             <a:r>
-              <a:rPr lang="en-US" smtClean="0"/>
+              <a:rPr lang="en-US"/>
               <a:t>Second level</a:t>
             </a:r>
           </a:p>
           <a:p>
             <a:pPr lvl="2"/>
             <a:r>
-              <a:rPr lang="en-US" smtClean="0"/>
+              <a:rPr lang="en-US"/>
               <a:t>Third level</a:t>
             </a:r>
           </a:p>
           <a:p>
             <a:pPr lvl="3"/>
             <a:r>
-              <a:rPr lang="en-US" smtClean="0"/>
+              <a:rPr lang="en-US"/>
               <a:t>Fourth level</a:t>
             </a:r>
           </a:p>
           <a:p>
             <a:pPr lvl="4"/>
             <a:r>
-              <a:rPr lang="en-US" smtClean="0"/>
+              <a:rPr lang="en-US"/>
               <a:t>Fifth level</a:t>
             </a:r>
-            <a:endParaRPr lang="en-US"/>
           </a:p>
         </p:txBody>
       </p:sp>
@@ -475,7 +471,7 @@
           <a:p>
             <a:fld id="{91FD018C-AC80-4D60-BFEC-75D7D34C589D}" type="datetimeFigureOut">
               <a:rPr lang="en-US" smtClean="0"/>
-              <a:t>4/15/18</a:t>
+              <a:t>12/21/18</a:t>
             </a:fld>
             <a:endParaRPr lang="en-US"/>
           </a:p>
@@ -574,10 +570,9 @@
           <a:lstStyle/>
           <a:p>
             <a:r>
-              <a:rPr lang="en-US" smtClean="0"/>
+              <a:rPr lang="en-US"/>
               <a:t>Click to edit Master title style</a:t>
             </a:r>
-            <a:endParaRPr lang="en-US"/>
           </a:p>
         </p:txBody>
       </p:sp>
@@ -603,38 +598,37 @@
           <a:p>
             <a:pPr lvl="0"/>
             <a:r>
-              <a:rPr lang="en-US" smtClean="0"/>
+              <a:rPr lang="en-US"/>
               <a:t>Click to edit Master text styles</a:t>
             </a:r>
           </a:p>
           <a:p>
             <a:pPr lvl="1"/>
             <a:r>
-              <a:rPr lang="en-US" smtClean="0"/>
+              <a:rPr lang="en-US"/>
               <a:t>Second level</a:t>
             </a:r>
           </a:p>
           <a:p>
             <a:pPr lvl="2"/>
             <a:r>
-              <a:rPr lang="en-US" smtClean="0"/>
+              <a:rPr lang="en-US"/>
               <a:t>Third level</a:t>
             </a:r>
           </a:p>
           <a:p>
             <a:pPr lvl="3"/>
             <a:r>
-              <a:rPr lang="en-US" smtClean="0"/>
+              <a:rPr lang="en-US"/>
               <a:t>Fourth level</a:t>
             </a:r>
           </a:p>
           <a:p>
             <a:pPr lvl="4"/>
             <a:r>
-              <a:rPr lang="en-US" smtClean="0"/>
+              <a:rPr lang="en-US"/>
               <a:t>Fifth level</a:t>
             </a:r>
-            <a:endParaRPr lang="en-US"/>
           </a:p>
         </p:txBody>
       </p:sp>
@@ -655,7 +649,7 @@
           <a:p>
             <a:fld id="{91FD018C-AC80-4D60-BFEC-75D7D34C589D}" type="datetimeFigureOut">
               <a:rPr lang="en-US" smtClean="0"/>
-              <a:t>4/15/18</a:t>
+              <a:t>12/21/18</a:t>
             </a:fld>
             <a:endParaRPr lang="en-US"/>
           </a:p>
@@ -749,10 +743,9 @@
           <a:lstStyle/>
           <a:p>
             <a:r>
-              <a:rPr lang="en-US" smtClean="0"/>
+              <a:rPr lang="en-US"/>
               <a:t>Click to edit Master title style</a:t>
             </a:r>
-            <a:endParaRPr lang="en-US"/>
           </a:p>
         </p:txBody>
       </p:sp>
@@ -773,38 +766,37 @@
           <a:p>
             <a:pPr lvl="0"/>
             <a:r>
-              <a:rPr lang="en-US" smtClean="0"/>
+              <a:rPr lang="en-US"/>
               <a:t>Click to edit Master text styles</a:t>
             </a:r>
           </a:p>
           <a:p>
             <a:pPr lvl="1"/>
             <a:r>
-              <a:rPr lang="en-US" smtClean="0"/>
+              <a:rPr lang="en-US"/>
               <a:t>Second level</a:t>
             </a:r>
           </a:p>
           <a:p>
             <a:pPr lvl="2"/>
             <a:r>
-              <a:rPr lang="en-US" smtClean="0"/>
+              <a:rPr lang="en-US"/>
               <a:t>Third level</a:t>
             </a:r>
           </a:p>
           <a:p>
             <a:pPr lvl="3"/>
             <a:r>
-              <a:rPr lang="en-US" smtClean="0"/>
+              <a:rPr lang="en-US"/>
               <a:t>Fourth level</a:t>
             </a:r>
           </a:p>
           <a:p>
             <a:pPr lvl="4"/>
             <a:r>
-              <a:rPr lang="en-US" smtClean="0"/>
+              <a:rPr lang="en-US"/>
               <a:t>Fifth level</a:t>
             </a:r>
-            <a:endParaRPr lang="en-US"/>
           </a:p>
         </p:txBody>
       </p:sp>
@@ -825,7 +817,7 @@
           <a:p>
             <a:fld id="{91FD018C-AC80-4D60-BFEC-75D7D34C589D}" type="datetimeFigureOut">
               <a:rPr lang="en-US" smtClean="0"/>
-              <a:t>4/15/18</a:t>
+              <a:t>12/21/18</a:t>
             </a:fld>
             <a:endParaRPr lang="en-US"/>
           </a:p>
@@ -928,10 +920,9 @@
           </a:lstStyle>
           <a:p>
             <a:r>
-              <a:rPr lang="en-US" smtClean="0"/>
+              <a:rPr lang="en-US"/>
               <a:t>Click to edit Master title style</a:t>
             </a:r>
-            <a:endParaRPr lang="en-US"/>
           </a:p>
         </p:txBody>
       </p:sp>
@@ -1048,7 +1039,7 @@
           <a:p>
             <a:pPr lvl="0"/>
             <a:r>
-              <a:rPr lang="en-US" smtClean="0"/>
+              <a:rPr lang="en-US"/>
               <a:t>Click to edit Master text styles</a:t>
             </a:r>
           </a:p>
@@ -1071,7 +1062,7 @@
           <a:p>
             <a:fld id="{91FD018C-AC80-4D60-BFEC-75D7D34C589D}" type="datetimeFigureOut">
               <a:rPr lang="en-US" smtClean="0"/>
-              <a:t>4/15/18</a:t>
+              <a:t>12/21/18</a:t>
             </a:fld>
             <a:endParaRPr lang="en-US"/>
           </a:p>
@@ -1165,10 +1156,9 @@
           <a:lstStyle/>
           <a:p>
             <a:r>
-              <a:rPr lang="en-US" smtClean="0"/>
+              <a:rPr lang="en-US"/>
               <a:t>Click to edit Master title style</a:t>
             </a:r>
-            <a:endParaRPr lang="en-US"/>
           </a:p>
         </p:txBody>
       </p:sp>
@@ -1222,38 +1212,37 @@
           <a:p>
             <a:pPr lvl="0"/>
             <a:r>
-              <a:rPr lang="en-US" smtClean="0"/>
+              <a:rPr lang="en-US"/>
               <a:t>Click to edit Master text styles</a:t>
             </a:r>
           </a:p>
           <a:p>
             <a:pPr lvl="1"/>
             <a:r>
-              <a:rPr lang="en-US" smtClean="0"/>
+              <a:rPr lang="en-US"/>
               <a:t>Second level</a:t>
             </a:r>
           </a:p>
           <a:p>
             <a:pPr lvl="2"/>
             <a:r>
-              <a:rPr lang="en-US" smtClean="0"/>
+              <a:rPr lang="en-US"/>
               <a:t>Third level</a:t>
             </a:r>
           </a:p>
           <a:p>
             <a:pPr lvl="3"/>
             <a:r>
-              <a:rPr lang="en-US" smtClean="0"/>
+              <a:rPr lang="en-US"/>
               <a:t>Fourth level</a:t>
             </a:r>
           </a:p>
           <a:p>
             <a:pPr lvl="4"/>
             <a:r>
-              <a:rPr lang="en-US" smtClean="0"/>
+              <a:rPr lang="en-US"/>
               <a:t>Fifth level</a:t>
             </a:r>
-            <a:endParaRPr lang="en-US"/>
           </a:p>
         </p:txBody>
       </p:sp>
@@ -1307,38 +1296,37 @@
           <a:p>
             <a:pPr lvl="0"/>
             <a:r>
-              <a:rPr lang="en-US" smtClean="0"/>
+              <a:rPr lang="en-US"/>
               <a:t>Click to edit Master text styles</a:t>
             </a:r>
           </a:p>
           <a:p>
             <a:pPr lvl="1"/>
             <a:r>
-              <a:rPr lang="en-US" smtClean="0"/>
+              <a:rPr lang="en-US"/>
               <a:t>Second level</a:t>
             </a:r>
           </a:p>
           <a:p>
             <a:pPr lvl="2"/>
             <a:r>
-              <a:rPr lang="en-US" smtClean="0"/>
+              <a:rPr lang="en-US"/>
               <a:t>Third level</a:t>
             </a:r>
           </a:p>
           <a:p>
             <a:pPr lvl="3"/>
             <a:r>
-              <a:rPr lang="en-US" smtClean="0"/>
+              <a:rPr lang="en-US"/>
               <a:t>Fourth level</a:t>
             </a:r>
           </a:p>
           <a:p>
             <a:pPr lvl="4"/>
             <a:r>
-              <a:rPr lang="en-US" smtClean="0"/>
+              <a:rPr lang="en-US"/>
               <a:t>Fifth level</a:t>
             </a:r>
-            <a:endParaRPr lang="en-US"/>
           </a:p>
         </p:txBody>
       </p:sp>
@@ -1359,7 +1347,7 @@
           <a:p>
             <a:fld id="{91FD018C-AC80-4D60-BFEC-75D7D34C589D}" type="datetimeFigureOut">
               <a:rPr lang="en-US" smtClean="0"/>
-              <a:t>4/15/18</a:t>
+              <a:t>12/21/18</a:t>
             </a:fld>
             <a:endParaRPr lang="en-US"/>
           </a:p>
@@ -1462,10 +1450,9 @@
           </a:lstStyle>
           <a:p>
             <a:r>
-              <a:rPr lang="en-US" smtClean="0"/>
+              <a:rPr lang="en-US"/>
               <a:t>Click to edit Master title style</a:t>
             </a:r>
-            <a:endParaRPr lang="en-US"/>
           </a:p>
         </p:txBody>
       </p:sp>
@@ -1528,7 +1515,7 @@
           <a:p>
             <a:pPr lvl="0"/>
             <a:r>
-              <a:rPr lang="en-US" smtClean="0"/>
+              <a:rPr lang="en-US"/>
               <a:t>Click to edit Master text styles</a:t>
             </a:r>
           </a:p>
@@ -1584,38 +1571,37 @@
           <a:p>
             <a:pPr lvl="0"/>
             <a:r>
-              <a:rPr lang="en-US" smtClean="0"/>
+              <a:rPr lang="en-US"/>
               <a:t>Click to edit Master text styles</a:t>
             </a:r>
           </a:p>
           <a:p>
             <a:pPr lvl="1"/>
             <a:r>
-              <a:rPr lang="en-US" smtClean="0"/>
+              <a:rPr lang="en-US"/>
               <a:t>Second level</a:t>
             </a:r>
           </a:p>
           <a:p>
             <a:pPr lvl="2"/>
             <a:r>
-              <a:rPr lang="en-US" smtClean="0"/>
+              <a:rPr lang="en-US"/>
               <a:t>Third level</a:t>
             </a:r>
           </a:p>
           <a:p>
             <a:pPr lvl="3"/>
             <a:r>
-              <a:rPr lang="en-US" smtClean="0"/>
+              <a:rPr lang="en-US"/>
               <a:t>Fourth level</a:t>
             </a:r>
           </a:p>
           <a:p>
             <a:pPr lvl="4"/>
             <a:r>
-              <a:rPr lang="en-US" smtClean="0"/>
+              <a:rPr lang="en-US"/>
               <a:t>Fifth level</a:t>
             </a:r>
-            <a:endParaRPr lang="en-US"/>
           </a:p>
         </p:txBody>
       </p:sp>
@@ -1678,7 +1664,7 @@
           <a:p>
             <a:pPr lvl="0"/>
             <a:r>
-              <a:rPr lang="en-US" smtClean="0"/>
+              <a:rPr lang="en-US"/>
               <a:t>Click to edit Master text styles</a:t>
             </a:r>
           </a:p>
@@ -1734,38 +1720,37 @@
           <a:p>
             <a:pPr lvl="0"/>
             <a:r>
-              <a:rPr lang="en-US" smtClean="0"/>
+              <a:rPr lang="en-US"/>
               <a:t>Click to edit Master text styles</a:t>
             </a:r>
           </a:p>
           <a:p>
             <a:pPr lvl="1"/>
             <a:r>
-              <a:rPr lang="en-US" smtClean="0"/>
+              <a:rPr lang="en-US"/>
               <a:t>Second level</a:t>
             </a:r>
           </a:p>
           <a:p>
             <a:pPr lvl="2"/>
             <a:r>
-              <a:rPr lang="en-US" smtClean="0"/>
+              <a:rPr lang="en-US"/>
               <a:t>Third level</a:t>
             </a:r>
           </a:p>
           <a:p>
             <a:pPr lvl="3"/>
             <a:r>
-              <a:rPr lang="en-US" smtClean="0"/>
+              <a:rPr lang="en-US"/>
               <a:t>Fourth level</a:t>
             </a:r>
           </a:p>
           <a:p>
             <a:pPr lvl="4"/>
             <a:r>
-              <a:rPr lang="en-US" smtClean="0"/>
+              <a:rPr lang="en-US"/>
               <a:t>Fifth level</a:t>
             </a:r>
-            <a:endParaRPr lang="en-US"/>
           </a:p>
         </p:txBody>
       </p:sp>
@@ -1786,7 +1771,7 @@
           <a:p>
             <a:fld id="{91FD018C-AC80-4D60-BFEC-75D7D34C589D}" type="datetimeFigureOut">
               <a:rPr lang="en-US" smtClean="0"/>
-              <a:t>4/15/18</a:t>
+              <a:t>12/21/18</a:t>
             </a:fld>
             <a:endParaRPr lang="en-US"/>
           </a:p>
@@ -1880,10 +1865,9 @@
           <a:lstStyle/>
           <a:p>
             <a:r>
-              <a:rPr lang="en-US" smtClean="0"/>
+              <a:rPr lang="en-US"/>
               <a:t>Click to edit Master title style</a:t>
             </a:r>
-            <a:endParaRPr lang="en-US"/>
           </a:p>
         </p:txBody>
       </p:sp>
@@ -1904,7 +1888,7 @@
           <a:p>
             <a:fld id="{91FD018C-AC80-4D60-BFEC-75D7D34C589D}" type="datetimeFigureOut">
               <a:rPr lang="en-US" smtClean="0"/>
-              <a:t>4/15/18</a:t>
+              <a:t>12/21/18</a:t>
             </a:fld>
             <a:endParaRPr lang="en-US"/>
           </a:p>
@@ -1999,7 +1983,7 @@
           <a:p>
             <a:fld id="{91FD018C-AC80-4D60-BFEC-75D7D34C589D}" type="datetimeFigureOut">
               <a:rPr lang="en-US" smtClean="0"/>
-              <a:t>4/15/18</a:t>
+              <a:t>12/21/18</a:t>
             </a:fld>
             <a:endParaRPr lang="en-US"/>
           </a:p>
@@ -2102,10 +2086,9 @@
           </a:lstStyle>
           <a:p>
             <a:r>
-              <a:rPr lang="en-US" smtClean="0"/>
+              <a:rPr lang="en-US"/>
               <a:t>Click to edit Master title style</a:t>
             </a:r>
-            <a:endParaRPr lang="en-US"/>
           </a:p>
         </p:txBody>
       </p:sp>
@@ -2159,38 +2142,37 @@
           <a:p>
             <a:pPr lvl="0"/>
             <a:r>
-              <a:rPr lang="en-US" smtClean="0"/>
+              <a:rPr lang="en-US"/>
               <a:t>Click to edit Master text styles</a:t>
             </a:r>
           </a:p>
           <a:p>
             <a:pPr lvl="1"/>
             <a:r>
-              <a:rPr lang="en-US" smtClean="0"/>
+              <a:rPr lang="en-US"/>
               <a:t>Second level</a:t>
             </a:r>
           </a:p>
           <a:p>
             <a:pPr lvl="2"/>
             <a:r>
-              <a:rPr lang="en-US" smtClean="0"/>
+              <a:rPr lang="en-US"/>
               <a:t>Third level</a:t>
             </a:r>
           </a:p>
           <a:p>
             <a:pPr lvl="3"/>
             <a:r>
-              <a:rPr lang="en-US" smtClean="0"/>
+              <a:rPr lang="en-US"/>
               <a:t>Fourth level</a:t>
             </a:r>
           </a:p>
           <a:p>
             <a:pPr lvl="4"/>
             <a:r>
-              <a:rPr lang="en-US" smtClean="0"/>
+              <a:rPr lang="en-US"/>
               <a:t>Fifth level</a:t>
             </a:r>
-            <a:endParaRPr lang="en-US"/>
           </a:p>
         </p:txBody>
       </p:sp>
@@ -2253,7 +2235,7 @@
           <a:p>
             <a:pPr lvl="0"/>
             <a:r>
-              <a:rPr lang="en-US" smtClean="0"/>
+              <a:rPr lang="en-US"/>
               <a:t>Click to edit Master text styles</a:t>
             </a:r>
           </a:p>
@@ -2276,7 +2258,7 @@
           <a:p>
             <a:fld id="{91FD018C-AC80-4D60-BFEC-75D7D34C589D}" type="datetimeFigureOut">
               <a:rPr lang="en-US" smtClean="0"/>
-              <a:t>4/15/18</a:t>
+              <a:t>12/21/18</a:t>
             </a:fld>
             <a:endParaRPr lang="en-US"/>
           </a:p>
@@ -2379,10 +2361,9 @@
           </a:lstStyle>
           <a:p>
             <a:r>
-              <a:rPr lang="en-US" smtClean="0"/>
+              <a:rPr lang="en-US"/>
               <a:t>Click to edit Master title style</a:t>
             </a:r>
-            <a:endParaRPr lang="en-US"/>
           </a:p>
         </p:txBody>
       </p:sp>
@@ -2506,7 +2487,7 @@
           <a:p>
             <a:pPr lvl="0"/>
             <a:r>
-              <a:rPr lang="en-US" smtClean="0"/>
+              <a:rPr lang="en-US"/>
               <a:t>Click to edit Master text styles</a:t>
             </a:r>
           </a:p>
@@ -2529,7 +2510,7 @@
           <a:p>
             <a:fld id="{91FD018C-AC80-4D60-BFEC-75D7D34C589D}" type="datetimeFigureOut">
               <a:rPr lang="en-US" smtClean="0"/>
-              <a:t>4/15/18</a:t>
+              <a:t>12/21/18</a:t>
             </a:fld>
             <a:endParaRPr lang="en-US"/>
           </a:p>
@@ -2638,10 +2619,9 @@
           <a:lstStyle/>
           <a:p>
             <a:r>
-              <a:rPr lang="en-US" smtClean="0"/>
+              <a:rPr lang="en-US"/>
               <a:t>Click to edit Master title style</a:t>
             </a:r>
-            <a:endParaRPr lang="en-US"/>
           </a:p>
         </p:txBody>
       </p:sp>
@@ -2672,38 +2652,37 @@
           <a:p>
             <a:pPr lvl="0"/>
             <a:r>
-              <a:rPr lang="en-US" smtClean="0"/>
+              <a:rPr lang="en-US"/>
               <a:t>Click to edit Master text styles</a:t>
             </a:r>
           </a:p>
           <a:p>
             <a:pPr lvl="1"/>
             <a:r>
-              <a:rPr lang="en-US" smtClean="0"/>
+              <a:rPr lang="en-US"/>
               <a:t>Second level</a:t>
             </a:r>
           </a:p>
           <a:p>
             <a:pPr lvl="2"/>
             <a:r>
-              <a:rPr lang="en-US" smtClean="0"/>
+              <a:rPr lang="en-US"/>
               <a:t>Third level</a:t>
             </a:r>
           </a:p>
           <a:p>
             <a:pPr lvl="3"/>
             <a:r>
-              <a:rPr lang="en-US" smtClean="0"/>
+              <a:rPr lang="en-US"/>
               <a:t>Fourth level</a:t>
             </a:r>
           </a:p>
           <a:p>
             <a:pPr lvl="4"/>
             <a:r>
-              <a:rPr lang="en-US" smtClean="0"/>
+              <a:rPr lang="en-US"/>
               <a:t>Fifth level</a:t>
             </a:r>
-            <a:endParaRPr lang="en-US"/>
           </a:p>
         </p:txBody>
       </p:sp>
@@ -2742,7 +2721,7 @@
           <a:p>
             <a:fld id="{91FD018C-AC80-4D60-BFEC-75D7D34C589D}" type="datetimeFigureOut">
               <a:rPr lang="en-US" smtClean="0"/>
-              <a:t>4/15/18</a:t>
+              <a:t>12/21/18</a:t>
             </a:fld>
             <a:endParaRPr lang="en-US"/>
           </a:p>
@@ -3216,18 +3195,9 @@
           <a:lstStyle/>
           <a:p>
             <a:r>
-              <a:rPr lang="en-US" sz="2400" dirty="0" smtClean="0"/>
-              <a:t>Europe C→T enriched </a:t>
-            </a:r>
-            <a:r>
-              <a:rPr lang="en-US" sz="2400" dirty="0" smtClean="0"/>
-              <a:t>(#1</a:t>
-            </a:r>
-            <a:r>
-              <a:rPr lang="en-US" sz="2400" dirty="0" smtClean="0"/>
-              <a:t>)</a:t>
-            </a:r>
-            <a:endParaRPr lang="en-US" sz="2400" dirty="0"/>
+              <a:rPr lang="en-US" sz="2400" dirty="0"/>
+              <a:t>Europe C→T enriched (#1)</a:t>
+            </a:r>
           </a:p>
         </p:txBody>
       </p:sp>
@@ -3285,7 +3255,7 @@
         </p:nvSpPr>
         <p:spPr>
           <a:xfrm>
-            <a:off x="18516597" y="4800600"/>
+            <a:off x="18440400" y="4724400"/>
             <a:ext cx="4601284" cy="461665"/>
           </a:xfrm>
           <a:prstGeom prst="rect">
@@ -3300,14 +3270,9 @@
           <a:lstStyle/>
           <a:p>
             <a:r>
-              <a:rPr lang="en-US" sz="2400" dirty="0" smtClean="0"/>
-              <a:t>Japan enriched </a:t>
-            </a:r>
-            <a:r>
-              <a:rPr lang="en-US" sz="2400" dirty="0" smtClean="0"/>
-              <a:t>(#3a, #3b)</a:t>
-            </a:r>
-            <a:endParaRPr lang="en-US" sz="2400" dirty="0"/>
+              <a:rPr lang="en-US" sz="2400" dirty="0"/>
+              <a:t>Japan enriched (#3a, #3b)</a:t>
+            </a:r>
           </a:p>
         </p:txBody>
       </p:sp>
@@ -3380,18 +3345,9 @@
           <a:lstStyle/>
           <a:p>
             <a:r>
-              <a:rPr lang="en-US" sz="2400" dirty="0" smtClean="0"/>
-              <a:t>Asia enriched </a:t>
-            </a:r>
-            <a:r>
-              <a:rPr lang="en-US" sz="2400" dirty="0" smtClean="0"/>
-              <a:t>(#2</a:t>
-            </a:r>
-            <a:r>
-              <a:rPr lang="en-US" sz="2400" dirty="0" smtClean="0"/>
-              <a:t>)</a:t>
-            </a:r>
-            <a:endParaRPr lang="en-US" sz="2400" dirty="0"/>
+              <a:rPr lang="en-US" sz="2400" dirty="0"/>
+              <a:t>Asia enriched (#2a)</a:t>
+            </a:r>
           </a:p>
         </p:txBody>
       </p:sp>
@@ -3403,14 +3359,16 @@
         </p:nvSpPr>
         <p:spPr>
           <a:xfrm>
-            <a:off x="18307751" y="5715000"/>
+            <a:off x="18307751" y="5674326"/>
             <a:ext cx="141805" cy="421674"/>
           </a:xfrm>
           <a:prstGeom prst="rect">
             <a:avLst/>
           </a:prstGeom>
           <a:solidFill>
-            <a:schemeClr val="tx1"/>
+            <a:schemeClr val="bg1">
+              <a:lumMod val="50000"/>
+            </a:schemeClr>
           </a:solidFill>
           <a:ln>
             <a:noFill/>
@@ -3437,7 +3395,13 @@
           <a:lstStyle/>
           <a:p>
             <a:pPr algn="ctr"/>
-            <a:endParaRPr lang="en-US"/>
+            <a:endParaRPr lang="en-US">
+              <a:solidFill>
+                <a:schemeClr val="bg1">
+                  <a:lumMod val="50000"/>
+                </a:schemeClr>
+              </a:solidFill>
+            </a:endParaRPr>
           </a:p>
         </p:txBody>
       </p:sp>
@@ -3464,14 +3428,15 @@
           <a:lstStyle/>
           <a:p>
             <a:r>
-              <a:rPr lang="en-US" sz="2400" dirty="0" smtClean="0"/>
-              <a:t>CpG transitions </a:t>
-            </a:r>
-            <a:r>
-              <a:rPr lang="en-US" sz="2400" dirty="0" smtClean="0"/>
-              <a:t>(#4)</a:t>
-            </a:r>
-            <a:endParaRPr lang="en-US" sz="2400" dirty="0"/>
+              <a:rPr lang="en-US" sz="2400" dirty="0">
+                <a:solidFill>
+                  <a:schemeClr val="bg1">
+                    <a:lumMod val="50000"/>
+                  </a:schemeClr>
+                </a:solidFill>
+              </a:rPr>
+              <a:t>CpG transitions (#4)</a:t>
+            </a:r>
           </a:p>
         </p:txBody>
       </p:sp>
@@ -3546,16 +3511,6 @@
           <a:lstStyle/>
           <a:p>
             <a:r>
-              <a:rPr lang="en-US" sz="2400" dirty="0" smtClean="0">
-                <a:solidFill>
-                  <a:schemeClr val="bg1">
-                    <a:lumMod val="50000"/>
-                  </a:schemeClr>
-                </a:solidFill>
-              </a:rPr>
-              <a:t>CpG transversions</a:t>
-            </a:r>
-            <a:r>
               <a:rPr lang="en-US" sz="2400" dirty="0">
                 <a:solidFill>
                   <a:schemeClr val="bg1">
@@ -3563,35 +3518,8 @@
                   </a:schemeClr>
                 </a:solidFill>
               </a:rPr>
-              <a:t> </a:t>
-            </a:r>
-            <a:r>
-              <a:rPr lang="en-US" sz="2400" dirty="0" smtClean="0">
-                <a:solidFill>
-                  <a:schemeClr val="bg1">
-                    <a:lumMod val="50000"/>
-                  </a:schemeClr>
-                </a:solidFill>
-              </a:rPr>
-              <a:t>(#5</a:t>
-            </a:r>
-            <a:r>
-              <a:rPr lang="en-US" sz="2400" dirty="0" smtClean="0">
-                <a:solidFill>
-                  <a:schemeClr val="bg1">
-                    <a:lumMod val="50000"/>
-                  </a:schemeClr>
-                </a:solidFill>
-              </a:rPr>
-              <a:t>)</a:t>
-            </a:r>
-            <a:endParaRPr lang="en-US" sz="2400" dirty="0">
-              <a:solidFill>
-                <a:schemeClr val="bg1">
-                  <a:lumMod val="50000"/>
-                </a:schemeClr>
-              </a:solidFill>
-            </a:endParaRPr>
+              <a:t>CpG transversions (#5)</a:t>
+            </a:r>
           </a:p>
         </p:txBody>
       </p:sp>
@@ -3604,14 +3532,14 @@
           <p:nvPr>
             <p:extLst>
               <p:ext uri="{D42A27DB-BD31-4B8C-83A1-F6EECF244321}">
-                <p14:modId xmlns:p14="http://schemas.microsoft.com/office/powerpoint/2010/main" val="2087483757"/>
+                <p14:modId xmlns:p14="http://schemas.microsoft.com/office/powerpoint/2010/main" val="2074222759"/>
               </p:ext>
             </p:extLst>
           </p:nvPr>
         </p:nvGraphicFramePr>
         <p:xfrm>
-          <a:off x="18592800" y="6781800"/>
-          <a:ext cx="4495800" cy="7833360"/>
+          <a:off x="22174200" y="4407978"/>
+          <a:ext cx="4495800" cy="9448800"/>
         </p:xfrm>
         <a:graphic>
           <a:graphicData uri="http://schemas.openxmlformats.org/drawingml/2006/table">
@@ -3620,8 +3548,20 @@
                 <a:tableStyleId>{073A0DAA-6AF3-43AB-8588-CEC1D06C72B9}</a:tableStyleId>
               </a:tblPr>
               <a:tblGrid>
-                <a:gridCol w="2514600"/>
-                <a:gridCol w="1981200"/>
+                <a:gridCol w="2514600">
+                  <a:extLst>
+                    <a:ext uri="{9D8B030D-6E8A-4147-A177-3AD203B41FA5}">
+                      <a16:colId xmlns:a16="http://schemas.microsoft.com/office/drawing/2014/main" val="20000"/>
+                    </a:ext>
+                  </a:extLst>
+                </a:gridCol>
+                <a:gridCol w="1981200">
+                  <a:extLst>
+                    <a:ext uri="{9D8B030D-6E8A-4147-A177-3AD203B41FA5}">
+                      <a16:colId xmlns:a16="http://schemas.microsoft.com/office/drawing/2014/main" val="20001"/>
+                    </a:ext>
+                  </a:extLst>
+                </a:gridCol>
               </a:tblGrid>
               <a:tr h="457200">
                 <a:tc gridSpan="2">
@@ -3631,10 +3571,9 @@
                     <a:p>
                       <a:pPr algn="ctr"/>
                       <a:r>
-                        <a:rPr lang="en-US" sz="2800" b="1" dirty="0" smtClean="0"/>
+                        <a:rPr lang="en-US" sz="2800" b="1" dirty="0"/>
                         <a:t> Cluster Membership</a:t>
                       </a:r>
-                      <a:endParaRPr lang="en-US" sz="2800" b="1" dirty="0"/>
                     </a:p>
                   </a:txBody>
                   <a:tcPr anchor="ctr">
@@ -3683,6 +3622,11 @@
                   </a:txBody>
                   <a:tcPr/>
                 </a:tc>
+                <a:extLst>
+                  <a:ext uri="{0D108BD9-81ED-4DB2-BD59-A6C34878D82A}">
+                    <a16:rowId xmlns:a16="http://schemas.microsoft.com/office/drawing/2014/main" val="10000"/>
+                  </a:ext>
+                </a:extLst>
               </a:tr>
               <a:tr h="457200">
                 <a:tc>
@@ -3692,26 +3636,17 @@
                     <a:p>
                       <a:pPr algn="ctr"/>
                       <a:r>
-                        <a:rPr lang="en-US" sz="2400" dirty="0" smtClean="0"/>
+                        <a:rPr lang="en-US" sz="2400" dirty="0"/>
                         <a:t>Europe C→T</a:t>
                       </a:r>
                       <a:r>
-                        <a:rPr lang="en-US" sz="2400" baseline="0" dirty="0" smtClean="0"/>
+                        <a:rPr lang="en-US" sz="2400" baseline="0" dirty="0"/>
                         <a:t> </a:t>
                       </a:r>
                       <a:r>
-                        <a:rPr lang="en-US" sz="2400" dirty="0" smtClean="0"/>
-                        <a:t>enriched </a:t>
+                        <a:rPr lang="en-US" sz="2400" dirty="0"/>
+                        <a:t>enriched (#1)</a:t>
                       </a:r>
-                      <a:r>
-                        <a:rPr lang="en-US" sz="2400" dirty="0" smtClean="0"/>
-                        <a:t>(#1</a:t>
-                      </a:r>
-                      <a:r>
-                        <a:rPr lang="en-US" sz="2400" dirty="0" smtClean="0"/>
-                        <a:t>)</a:t>
-                      </a:r>
-                      <a:endParaRPr lang="en-US" sz="2400" dirty="0"/>
                     </a:p>
                   </a:txBody>
                   <a:tcPr anchor="ctr">
@@ -3765,47 +3700,43 @@
                     <a:p>
                       <a:pPr algn="ctr"/>
                       <a:r>
-                        <a:rPr lang="en-US" sz="2000" dirty="0" smtClean="0"/>
+                        <a:rPr lang="en-US" sz="2000" dirty="0"/>
                         <a:t>TCT→T</a:t>
                       </a:r>
                     </a:p>
                     <a:p>
                       <a:pPr algn="ctr"/>
                       <a:r>
-                        <a:rPr lang="en-US" sz="2000" dirty="0" smtClean="0"/>
+                        <a:rPr lang="en-US" sz="2000" dirty="0"/>
                         <a:t>ACC→T</a:t>
                       </a:r>
                     </a:p>
                     <a:p>
                       <a:pPr algn="ctr"/>
                       <a:r>
-                        <a:rPr lang="en-US" sz="2000" dirty="0" smtClean="0"/>
+                        <a:rPr lang="en-US" sz="2000" dirty="0"/>
                         <a:t>TCA→T</a:t>
                       </a:r>
                     </a:p>
                     <a:p>
                       <a:pPr algn="ctr"/>
                       <a:r>
-                        <a:rPr lang="en-US" sz="2000" dirty="0" smtClean="0"/>
+                        <a:rPr lang="en-US" sz="2000" dirty="0"/>
                         <a:t>CCC→T</a:t>
                       </a:r>
                     </a:p>
                     <a:p>
                       <a:pPr algn="ctr"/>
                       <a:r>
-                        <a:rPr lang="en-US" sz="2000" dirty="0" smtClean="0"/>
+                        <a:rPr lang="en-US" sz="2000" dirty="0"/>
                         <a:t>ACT→T</a:t>
                       </a:r>
                     </a:p>
                     <a:p>
                       <a:pPr algn="ctr"/>
                       <a:r>
-                        <a:rPr lang="en-US" sz="2000" dirty="0" smtClean="0"/>
-                        <a:t>TCC→</a:t>
-                      </a:r>
-                      <a:r>
-                        <a:rPr lang="en-US" sz="2000" dirty="0" smtClean="0"/>
-                        <a:t>T</a:t>
+                        <a:rPr lang="en-US" sz="2000" dirty="0"/>
+                        <a:t>TCC→T</a:t>
                       </a:r>
                     </a:p>
                     <a:p>
@@ -3827,7 +3758,7 @@
                         <a:defRPr/>
                       </a:pPr>
                       <a:r>
-                        <a:rPr lang="en-US" sz="2000" dirty="0" smtClean="0"/>
+                        <a:rPr lang="en-US" sz="2000" dirty="0"/>
                         <a:t>GCC→T</a:t>
                       </a:r>
                     </a:p>
@@ -3876,27 +3807,23 @@
                     <a:noFill/>
                   </a:tcPr>
                 </a:tc>
+                <a:extLst>
+                  <a:ext uri="{0D108BD9-81ED-4DB2-BD59-A6C34878D82A}">
+                    <a16:rowId xmlns:a16="http://schemas.microsoft.com/office/drawing/2014/main" val="10001"/>
+                  </a:ext>
+                </a:extLst>
               </a:tr>
               <a:tr h="457200">
-                <a:tc>
+                <a:tc rowSpan="2">
                   <a:txBody>
                     <a:bodyPr/>
                     <a:lstStyle/>
                     <a:p>
                       <a:pPr algn="ctr"/>
                       <a:r>
-                        <a:rPr lang="en-US" sz="2400" dirty="0" smtClean="0"/>
-                        <a:t>Asia enriched </a:t>
+                        <a:rPr lang="en-US" sz="2400" dirty="0"/>
+                        <a:t>Asia enriched (#2)</a:t>
                       </a:r>
-                      <a:r>
-                        <a:rPr lang="en-US" sz="2400" dirty="0" smtClean="0"/>
-                        <a:t>(#2</a:t>
-                      </a:r>
-                      <a:r>
-                        <a:rPr lang="en-US" sz="2400" dirty="0" smtClean="0"/>
-                        <a:t>)</a:t>
-                      </a:r>
-                      <a:endParaRPr lang="en-US" sz="2400" dirty="0"/>
                     </a:p>
                   </a:txBody>
                   <a:tcPr anchor="ctr">
@@ -3950,24 +3877,23 @@
                     <a:p>
                       <a:pPr algn="ctr"/>
                       <a:r>
-                        <a:rPr lang="en-US" sz="2000" dirty="0" smtClean="0"/>
-                        <a:t>GAT→T</a:t>
+                        <a:rPr lang="en-US" sz="2000" dirty="0"/>
+                        <a:t>GAT→T (a)</a:t>
                       </a:r>
                     </a:p>
                     <a:p>
                       <a:pPr algn="ctr"/>
                       <a:r>
-                        <a:rPr lang="en-US" sz="2000" dirty="0" smtClean="0"/>
-                        <a:t>ACC→A</a:t>
+                        <a:rPr lang="en-US" sz="2000" dirty="0"/>
+                        <a:t>ACC→A (a)</a:t>
                       </a:r>
                     </a:p>
                     <a:p>
                       <a:pPr algn="ctr"/>
                       <a:r>
-                        <a:rPr lang="en-US" sz="2000" dirty="0" smtClean="0"/>
-                        <a:t>GAC→T</a:t>
+                        <a:rPr lang="en-US" sz="2000" dirty="0"/>
+                        <a:t>GAC→T (a)</a:t>
                       </a:r>
-                      <a:endParaRPr lang="en-US" sz="2000" dirty="0"/>
                     </a:p>
                   </a:txBody>
                   <a:tcPr anchor="ctr">
@@ -4014,6 +3940,171 @@
                     <a:noFill/>
                   </a:tcPr>
                 </a:tc>
+                <a:extLst>
+                  <a:ext uri="{0D108BD9-81ED-4DB2-BD59-A6C34878D82A}">
+                    <a16:rowId xmlns:a16="http://schemas.microsoft.com/office/drawing/2014/main" val="10002"/>
+                  </a:ext>
+                </a:extLst>
+              </a:tr>
+              <a:tr h="457200">
+                <a:tc vMerge="1">
+                  <a:txBody>
+                    <a:bodyPr/>
+                    <a:lstStyle/>
+                    <a:p>
+                      <a:pPr algn="ctr"/>
+                      <a:endParaRPr lang="en-US" sz="2400" dirty="0"/>
+                    </a:p>
+                  </a:txBody>
+                  <a:tcPr anchor="ctr">
+                    <a:lnL w="3175" cap="flat" cmpd="sng" algn="ctr">
+                      <a:solidFill>
+                        <a:schemeClr val="bg1">
+                          <a:lumMod val="65000"/>
+                        </a:schemeClr>
+                      </a:solidFill>
+                      <a:prstDash val="solid"/>
+                      <a:round/>
+                      <a:headEnd type="none" w="med" len="med"/>
+                      <a:tailEnd type="none" w="med" len="med"/>
+                    </a:lnL>
+                    <a:lnR w="3175" cap="flat" cmpd="sng" algn="ctr">
+                      <a:solidFill>
+                        <a:schemeClr val="bg1">
+                          <a:lumMod val="65000"/>
+                        </a:schemeClr>
+                      </a:solidFill>
+                      <a:prstDash val="solid"/>
+                      <a:round/>
+                      <a:headEnd type="none" w="med" len="med"/>
+                      <a:tailEnd type="none" w="med" len="med"/>
+                    </a:lnR>
+                    <a:lnT w="3175" cap="flat" cmpd="sng" algn="ctr">
+                      <a:solidFill>
+                        <a:schemeClr val="tx1"/>
+                      </a:solidFill>
+                      <a:prstDash val="solid"/>
+                      <a:round/>
+                      <a:headEnd type="none" w="med" len="med"/>
+                      <a:tailEnd type="none" w="med" len="med"/>
+                    </a:lnT>
+                    <a:lnB w="3175" cap="flat" cmpd="sng" algn="ctr">
+                      <a:solidFill>
+                        <a:schemeClr val="tx1"/>
+                      </a:solidFill>
+                      <a:prstDash val="solid"/>
+                      <a:round/>
+                      <a:headEnd type="none" w="med" len="med"/>
+                      <a:tailEnd type="none" w="med" len="med"/>
+                    </a:lnB>
+                    <a:noFill/>
+                  </a:tcPr>
+                </a:tc>
+                <a:tc>
+                  <a:txBody>
+                    <a:bodyPr/>
+                    <a:lstStyle/>
+                    <a:p>
+                      <a:pPr marL="0" marR="0" lvl="0" indent="0" algn="ctr" defTabSz="2612532" rtl="0" eaLnBrk="1" fontAlgn="auto" latinLnBrk="0" hangingPunct="1">
+                        <a:lnSpc>
+                          <a:spcPct val="100000"/>
+                        </a:lnSpc>
+                        <a:spcBef>
+                          <a:spcPts val="0"/>
+                        </a:spcBef>
+                        <a:spcAft>
+                          <a:spcPts val="0"/>
+                        </a:spcAft>
+                        <a:buClrTx/>
+                        <a:buSzTx/>
+                        <a:buFontTx/>
+                        <a:buNone/>
+                        <a:tabLst/>
+                        <a:defRPr/>
+                      </a:pPr>
+                      <a:r>
+                        <a:rPr lang="en-US" sz="2000" dirty="0"/>
+                        <a:t>GAA→T (b)</a:t>
+                      </a:r>
+                    </a:p>
+                    <a:p>
+                      <a:pPr algn="ctr"/>
+                      <a:r>
+                        <a:rPr lang="en-US" sz="2000" dirty="0"/>
+                        <a:t>GCC→A (b)</a:t>
+                      </a:r>
+                    </a:p>
+                    <a:p>
+                      <a:pPr algn="ctr"/>
+                      <a:r>
+                        <a:rPr lang="en-US" sz="2000" dirty="0"/>
+                        <a:t>TCC→A (b)</a:t>
+                      </a:r>
+                    </a:p>
+                    <a:p>
+                      <a:pPr algn="ctr"/>
+                      <a:r>
+                        <a:rPr lang="en-US" sz="2000" dirty="0"/>
+                        <a:t>CCC→A (b)</a:t>
+                      </a:r>
+                    </a:p>
+                    <a:p>
+                      <a:pPr algn="ctr"/>
+                      <a:r>
+                        <a:rPr lang="en-US" sz="2000" dirty="0"/>
+                        <a:t>CCC→G (b)</a:t>
+                      </a:r>
+                    </a:p>
+                  </a:txBody>
+                  <a:tcPr anchor="ctr">
+                    <a:lnL w="3175" cap="flat" cmpd="sng" algn="ctr">
+                      <a:solidFill>
+                        <a:schemeClr val="bg1">
+                          <a:lumMod val="65000"/>
+                        </a:schemeClr>
+                      </a:solidFill>
+                      <a:prstDash val="solid"/>
+                      <a:round/>
+                      <a:headEnd type="none" w="med" len="med"/>
+                      <a:tailEnd type="none" w="med" len="med"/>
+                    </a:lnL>
+                    <a:lnR w="3175" cap="flat" cmpd="sng" algn="ctr">
+                      <a:solidFill>
+                        <a:schemeClr val="bg1">
+                          <a:lumMod val="65000"/>
+                        </a:schemeClr>
+                      </a:solidFill>
+                      <a:prstDash val="solid"/>
+                      <a:round/>
+                      <a:headEnd type="none" w="med" len="med"/>
+                      <a:tailEnd type="none" w="med" len="med"/>
+                    </a:lnR>
+                    <a:lnT w="3175" cap="flat" cmpd="sng" algn="ctr">
+                      <a:solidFill>
+                        <a:schemeClr val="tx1"/>
+                      </a:solidFill>
+                      <a:prstDash val="solid"/>
+                      <a:round/>
+                      <a:headEnd type="none" w="med" len="med"/>
+                      <a:tailEnd type="none" w="med" len="med"/>
+                    </a:lnT>
+                    <a:lnB w="3175" cap="flat" cmpd="sng" algn="ctr">
+                      <a:solidFill>
+                        <a:schemeClr val="tx1"/>
+                      </a:solidFill>
+                      <a:prstDash val="solid"/>
+                      <a:round/>
+                      <a:headEnd type="none" w="med" len="med"/>
+                      <a:tailEnd type="none" w="med" len="med"/>
+                    </a:lnB>
+                    <a:noFill/>
+                  </a:tcPr>
+                </a:tc>
+                <a:extLst>
+                  <a:ext uri="{0D108BD9-81ED-4DB2-BD59-A6C34878D82A}">
+                    <a16:rowId xmlns:a16="http://schemas.microsoft.com/office/drawing/2014/main" val="1965000087"/>
+                  </a:ext>
+                </a:extLst>
               </a:tr>
               <a:tr h="807720">
                 <a:tc rowSpan="2">
@@ -4023,34 +4114,17 @@
                     <a:p>
                       <a:pPr algn="ctr"/>
                       <a:r>
-                        <a:rPr lang="en-US" sz="2400" dirty="0" smtClean="0"/>
+                        <a:rPr lang="en-US" sz="2400" dirty="0"/>
                         <a:t>Japan</a:t>
                       </a:r>
                       <a:r>
-                        <a:rPr lang="en-US" sz="2400" baseline="0" dirty="0" smtClean="0"/>
+                        <a:rPr lang="en-US" sz="2400" baseline="0" dirty="0"/>
                         <a:t> </a:t>
                       </a:r>
                       <a:r>
-                        <a:rPr lang="en-US" sz="2400" dirty="0" smtClean="0"/>
-                        <a:t>enriched </a:t>
+                        <a:rPr lang="en-US" sz="2400" dirty="0"/>
+                        <a:t>enriched (#3a,  #3b)</a:t>
                       </a:r>
-                      <a:r>
-                        <a:rPr lang="en-US" sz="2400" dirty="0" smtClean="0"/>
-                        <a:t>(#3a</a:t>
-                      </a:r>
-                      <a:r>
-                        <a:rPr lang="en-US" sz="2400" dirty="0" smtClean="0"/>
-                        <a:t>,  </a:t>
-                      </a:r>
-                      <a:r>
-                        <a:rPr lang="en-US" sz="2400" dirty="0" smtClean="0"/>
-                        <a:t>#3b</a:t>
-                      </a:r>
-                      <a:r>
-                        <a:rPr lang="en-US" sz="2400" dirty="0" smtClean="0"/>
-                        <a:t>)</a:t>
-                      </a:r>
-                      <a:endParaRPr lang="en-US" sz="2400" dirty="0"/>
                     </a:p>
                   </a:txBody>
                   <a:tcPr anchor="ctr">
@@ -4104,14 +4178,14 @@
                     <a:p>
                       <a:pPr algn="ctr"/>
                       <a:r>
-                        <a:rPr lang="en-US" sz="2000" dirty="0" smtClean="0"/>
+                        <a:rPr lang="en-US" sz="2000" dirty="0"/>
                         <a:t>CAC→C (a)</a:t>
                       </a:r>
                     </a:p>
                     <a:p>
                       <a:pPr algn="ctr"/>
                       <a:r>
-                        <a:rPr lang="en-US" sz="2000" dirty="0" smtClean="0"/>
+                        <a:rPr lang="en-US" sz="2000" dirty="0"/>
                         <a:t>TAT→T (a)</a:t>
                       </a:r>
                     </a:p>
@@ -4160,6 +4234,11 @@
                     <a:noFill/>
                   </a:tcPr>
                 </a:tc>
+                <a:extLst>
+                  <a:ext uri="{0D108BD9-81ED-4DB2-BD59-A6C34878D82A}">
+                    <a16:rowId xmlns:a16="http://schemas.microsoft.com/office/drawing/2014/main" val="10003"/>
+                  </a:ext>
+                </a:extLst>
               </a:tr>
               <a:tr h="807720">
                 <a:tc vMerge="1">
@@ -4179,29 +4258,29 @@
                     <a:p>
                       <a:pPr algn="ctr"/>
                       <a:r>
-                        <a:rPr lang="en-US" sz="2000" dirty="0" smtClean="0"/>
+                        <a:rPr lang="en-US" sz="2000" dirty="0"/>
                         <a:t>GAC→C (b)</a:t>
                       </a:r>
                     </a:p>
                     <a:p>
                       <a:pPr algn="ctr"/>
                       <a:r>
-                        <a:rPr lang="en-US" sz="2000" dirty="0" smtClean="0"/>
+                        <a:rPr lang="en-US" sz="2000" dirty="0"/>
                         <a:t>AAC→C (b)</a:t>
                       </a:r>
                     </a:p>
                     <a:p>
                       <a:pPr algn="ctr"/>
                       <a:r>
-                        <a:rPr lang="en-US" sz="2000" dirty="0" smtClean="0"/>
+                        <a:rPr lang="en-US" sz="2000" dirty="0"/>
                         <a:t>TAC→C</a:t>
                       </a:r>
                       <a:r>
-                        <a:rPr lang="en-US" sz="2000" baseline="0" dirty="0" smtClean="0"/>
+                        <a:rPr lang="en-US" sz="2000" baseline="0" dirty="0"/>
                         <a:t> </a:t>
                       </a:r>
                       <a:r>
-                        <a:rPr lang="en-US" sz="2000" dirty="0" smtClean="0"/>
+                        <a:rPr lang="en-US" sz="2000" dirty="0"/>
                         <a:t>(b)</a:t>
                       </a:r>
                     </a:p>
@@ -4250,6 +4329,11 @@
                     <a:noFill/>
                   </a:tcPr>
                 </a:tc>
+                <a:extLst>
+                  <a:ext uri="{0D108BD9-81ED-4DB2-BD59-A6C34878D82A}">
+                    <a16:rowId xmlns:a16="http://schemas.microsoft.com/office/drawing/2014/main" val="10004"/>
+                  </a:ext>
+                </a:extLst>
               </a:tr>
               <a:tr h="960120">
                 <a:tc>
@@ -4275,7 +4359,7 @@
                         <a:defRPr/>
                       </a:pPr>
                       <a:r>
-                        <a:rPr lang="en-US" sz="2400" dirty="0" smtClean="0"/>
+                        <a:rPr lang="en-US" sz="2400" dirty="0"/>
                         <a:t>CpG transitions (#4)</a:t>
                       </a:r>
                     </a:p>
@@ -4331,7 +4415,7 @@
                     <a:p>
                       <a:pPr algn="ctr"/>
                       <a:r>
-                        <a:rPr lang="en-US" sz="2000" dirty="0" smtClean="0"/>
+                        <a:rPr lang="en-US" sz="2000" dirty="0"/>
                         <a:t>*CG→T (4 types)</a:t>
                       </a:r>
                     </a:p>
@@ -4380,6 +4464,11 @@
                     <a:noFill/>
                   </a:tcPr>
                 </a:tc>
+                <a:extLst>
+                  <a:ext uri="{0D108BD9-81ED-4DB2-BD59-A6C34878D82A}">
+                    <a16:rowId xmlns:a16="http://schemas.microsoft.com/office/drawing/2014/main" val="10005"/>
+                  </a:ext>
+                </a:extLst>
               </a:tr>
               <a:tr h="1188720">
                 <a:tc>
@@ -4389,18 +4478,9 @@
                     <a:p>
                       <a:pPr algn="ctr"/>
                       <a:r>
-                        <a:rPr lang="en-US" sz="2400" dirty="0" smtClean="0"/>
-                        <a:t>CpG transversions </a:t>
+                        <a:rPr lang="en-US" sz="2400" dirty="0"/>
+                        <a:t>CpG transversions (#5)</a:t>
                       </a:r>
-                      <a:r>
-                        <a:rPr lang="en-US" sz="2400" dirty="0" smtClean="0"/>
-                        <a:t>(#5</a:t>
-                      </a:r>
-                      <a:r>
-                        <a:rPr lang="en-US" sz="2400" dirty="0" smtClean="0"/>
-                        <a:t>)</a:t>
-                      </a:r>
-                      <a:endParaRPr lang="en-US" sz="2400" dirty="0"/>
                     </a:p>
                   </a:txBody>
                   <a:tcPr anchor="ctr">
@@ -4456,31 +4536,30 @@
                     <a:p>
                       <a:pPr algn="ctr"/>
                       <a:r>
-                        <a:rPr lang="en-US" sz="2000" dirty="0" smtClean="0"/>
+                        <a:rPr lang="en-US" sz="2000" dirty="0"/>
                         <a:t>GCG→G</a:t>
                       </a:r>
                     </a:p>
                     <a:p>
                       <a:pPr algn="ctr"/>
                       <a:r>
-                        <a:rPr lang="en-US" sz="2000" dirty="0" smtClean="0"/>
+                        <a:rPr lang="en-US" sz="2000" dirty="0"/>
                         <a:t>ACG→G</a:t>
                       </a:r>
                     </a:p>
                     <a:p>
                       <a:pPr algn="ctr"/>
                       <a:r>
-                        <a:rPr lang="en-US" sz="2000" dirty="0" smtClean="0"/>
+                        <a:rPr lang="en-US" sz="2000" dirty="0"/>
                         <a:t>CCG→A</a:t>
                       </a:r>
                     </a:p>
                     <a:p>
                       <a:pPr algn="ctr"/>
                       <a:r>
-                        <a:rPr lang="en-US" sz="2000" dirty="0" smtClean="0"/>
+                        <a:rPr lang="en-US" sz="2000" dirty="0"/>
                         <a:t>ACG→A</a:t>
                       </a:r>
-                      <a:endParaRPr lang="en-US" sz="2000" dirty="0"/>
                     </a:p>
                   </a:txBody>
                   <a:tcPr anchor="ctr">
@@ -4529,11 +4608,107 @@
                     <a:noFill/>
                   </a:tcPr>
                 </a:tc>
+                <a:extLst>
+                  <a:ext uri="{0D108BD9-81ED-4DB2-BD59-A6C34878D82A}">
+                    <a16:rowId xmlns:a16="http://schemas.microsoft.com/office/drawing/2014/main" val="10006"/>
+                  </a:ext>
+                </a:extLst>
               </a:tr>
             </a:tbl>
           </a:graphicData>
         </a:graphic>
       </p:graphicFrame>
+      <p:sp>
+        <p:nvSpPr>
+          <p:cNvPr id="16" name="Rectangle 15">
+            <a:extLst>
+              <a:ext uri="{FF2B5EF4-FFF2-40B4-BE49-F238E27FC236}">
+                <a16:creationId xmlns:a16="http://schemas.microsoft.com/office/drawing/2014/main" id="{2ABD320B-42A8-9342-BC26-9E269018510A}"/>
+              </a:ext>
+            </a:extLst>
+          </p:cNvPr>
+          <p:cNvSpPr/>
+          <p:nvPr/>
+        </p:nvSpPr>
+        <p:spPr>
+          <a:xfrm>
+            <a:off x="18298593" y="6211265"/>
+            <a:ext cx="149505" cy="570535"/>
+          </a:xfrm>
+          <a:prstGeom prst="rect">
+            <a:avLst/>
+          </a:prstGeom>
+          <a:solidFill>
+            <a:schemeClr val="tx1"/>
+          </a:solidFill>
+          <a:ln>
+            <a:noFill/>
+          </a:ln>
+        </p:spPr>
+        <p:style>
+          <a:lnRef idx="2">
+            <a:schemeClr val="accent1">
+              <a:shade val="50000"/>
+            </a:schemeClr>
+          </a:lnRef>
+          <a:fillRef idx="1">
+            <a:schemeClr val="accent1"/>
+          </a:fillRef>
+          <a:effectRef idx="0">
+            <a:schemeClr val="accent1"/>
+          </a:effectRef>
+          <a:fontRef idx="minor">
+            <a:schemeClr val="lt1"/>
+          </a:fontRef>
+        </p:style>
+        <p:txBody>
+          <a:bodyPr lIns="261253" tIns="130627" rIns="261253" bIns="130627" spcCol="0" rtlCol="0" anchor="ctr"/>
+          <a:lstStyle/>
+          <a:p>
+            <a:pPr algn="ctr"/>
+            <a:endParaRPr lang="en-US">
+              <a:solidFill>
+                <a:schemeClr val="tx1"/>
+              </a:solidFill>
+            </a:endParaRPr>
+          </a:p>
+        </p:txBody>
+      </p:sp>
+      <p:sp>
+        <p:nvSpPr>
+          <p:cNvPr id="17" name="TextBox 16">
+            <a:extLst>
+              <a:ext uri="{FF2B5EF4-FFF2-40B4-BE49-F238E27FC236}">
+                <a16:creationId xmlns:a16="http://schemas.microsoft.com/office/drawing/2014/main" id="{C48606CC-18B3-8041-8E6F-4CC7CA240731}"/>
+              </a:ext>
+            </a:extLst>
+          </p:cNvPr>
+          <p:cNvSpPr txBox="1"/>
+          <p:nvPr/>
+        </p:nvSpPr>
+        <p:spPr>
+          <a:xfrm>
+            <a:off x="18448098" y="6282419"/>
+            <a:ext cx="2964102" cy="461665"/>
+          </a:xfrm>
+          <a:prstGeom prst="rect">
+            <a:avLst/>
+          </a:prstGeom>
+          <a:noFill/>
+        </p:spPr>
+        <p:txBody>
+          <a:bodyPr wrap="square" rtlCol="0">
+            <a:spAutoFit/>
+          </a:bodyPr>
+          <a:lstStyle/>
+          <a:p>
+            <a:r>
+              <a:rPr lang="en-US" sz="2400" dirty="0"/>
+              <a:t>Asia enriched (#2b)</a:t>
+            </a:r>
+          </a:p>
+        </p:txBody>
+      </p:sp>
     </p:spTree>
     <p:extLst>
       <p:ext uri="{BB962C8B-B14F-4D97-AF65-F5344CB8AC3E}">

</xml_diff>